<commit_message>
004 adjustments after starting java
</commit_message>
<xml_diff>
--- a/maven4-java25-presentation.pptx
+++ b/maven4-java25-presentation.pptx
@@ -5,7 +5,7 @@
     <p:sldMasterId id="2147483648" r:id="rId1"/>
   </p:sldMasterIdLst>
   <p:notesMasterIdLst>
-    <p:notesMasterId r:id="rId43"/>
+    <p:notesMasterId r:id="rId44"/>
   </p:notesMasterIdLst>
   <p:sldIdLst>
     <p:sldId id="256" r:id="rId2"/>
@@ -30,25 +30,26 @@
     <p:sldId id="284" r:id="rId21"/>
     <p:sldId id="285" r:id="rId22"/>
     <p:sldId id="286" r:id="rId23"/>
-    <p:sldId id="287" r:id="rId24"/>
-    <p:sldId id="288" r:id="rId25"/>
-    <p:sldId id="261" r:id="rId26"/>
-    <p:sldId id="275" r:id="rId27"/>
-    <p:sldId id="289" r:id="rId28"/>
-    <p:sldId id="294" r:id="rId29"/>
-    <p:sldId id="290" r:id="rId30"/>
-    <p:sldId id="291" r:id="rId31"/>
-    <p:sldId id="292" r:id="rId32"/>
-    <p:sldId id="293" r:id="rId33"/>
-    <p:sldId id="295" r:id="rId34"/>
-    <p:sldId id="296" r:id="rId35"/>
-    <p:sldId id="297" r:id="rId36"/>
-    <p:sldId id="298" r:id="rId37"/>
-    <p:sldId id="270" r:id="rId38"/>
-    <p:sldId id="276" r:id="rId39"/>
-    <p:sldId id="271" r:id="rId40"/>
-    <p:sldId id="273" r:id="rId41"/>
-    <p:sldId id="274" r:id="rId42"/>
+    <p:sldId id="299" r:id="rId24"/>
+    <p:sldId id="287" r:id="rId25"/>
+    <p:sldId id="288" r:id="rId26"/>
+    <p:sldId id="261" r:id="rId27"/>
+    <p:sldId id="275" r:id="rId28"/>
+    <p:sldId id="289" r:id="rId29"/>
+    <p:sldId id="294" r:id="rId30"/>
+    <p:sldId id="290" r:id="rId31"/>
+    <p:sldId id="291" r:id="rId32"/>
+    <p:sldId id="292" r:id="rId33"/>
+    <p:sldId id="293" r:id="rId34"/>
+    <p:sldId id="295" r:id="rId35"/>
+    <p:sldId id="296" r:id="rId36"/>
+    <p:sldId id="297" r:id="rId37"/>
+    <p:sldId id="298" r:id="rId38"/>
+    <p:sldId id="270" r:id="rId39"/>
+    <p:sldId id="276" r:id="rId40"/>
+    <p:sldId id="271" r:id="rId41"/>
+    <p:sldId id="273" r:id="rId42"/>
+    <p:sldId id="274" r:id="rId43"/>
   </p:sldIdLst>
   <p:sldSz cx="12192000" cy="6858000"/>
   <p:notesSz cx="6858000" cy="9144000"/>
@@ -3928,7 +3929,7 @@
           <a:p>
             <a:fld id="{0311717A-8604-9C49-9115-9B2537028286}" type="datetimeFigureOut">
               <a:rPr lang="en-US" smtClean="0"/>
-              <a:t>11/25/25</a:t>
+              <a:t>11/26/25</a:t>
             </a:fld>
             <a:endParaRPr lang="en-US"/>
           </a:p>
@@ -5127,6 +5128,193 @@
   <p:cSld>
     <p:spTree>
       <p:nvGrpSpPr>
+        <p:cNvPr id="1" name="">
+          <a:extLst>
+            <a:ext uri="{FF2B5EF4-FFF2-40B4-BE49-F238E27FC236}">
+              <a16:creationId xmlns:a16="http://schemas.microsoft.com/office/drawing/2014/main" id="{4EF8D2CA-4BCF-35B1-E117-8086F87DF333}"/>
+            </a:ext>
+          </a:extLst>
+        </p:cNvPr>
+        <p:cNvGrpSpPr/>
+        <p:nvPr/>
+      </p:nvGrpSpPr>
+      <p:grpSpPr>
+        <a:xfrm>
+          <a:off x="0" y="0"/>
+          <a:ext cx="0" cy="0"/>
+          <a:chOff x="0" y="0"/>
+          <a:chExt cx="0" cy="0"/>
+        </a:xfrm>
+      </p:grpSpPr>
+      <p:sp>
+        <p:nvSpPr>
+          <p:cNvPr id="2" name="Slide Image Placeholder 1">
+            <a:extLst>
+              <a:ext uri="{FF2B5EF4-FFF2-40B4-BE49-F238E27FC236}">
+                <a16:creationId xmlns:a16="http://schemas.microsoft.com/office/drawing/2014/main" id="{F528AF9F-7C34-3843-7F3F-BDD9722F4171}"/>
+              </a:ext>
+            </a:extLst>
+          </p:cNvPr>
+          <p:cNvSpPr>
+            <a:spLocks noGrp="1" noRot="1" noChangeAspect="1"/>
+          </p:cNvSpPr>
+          <p:nvPr>
+            <p:ph type="sldImg"/>
+          </p:nvPr>
+        </p:nvSpPr>
+        <p:spPr/>
+      </p:sp>
+      <p:sp>
+        <p:nvSpPr>
+          <p:cNvPr id="3" name="Notes Placeholder 2">
+            <a:extLst>
+              <a:ext uri="{FF2B5EF4-FFF2-40B4-BE49-F238E27FC236}">
+                <a16:creationId xmlns:a16="http://schemas.microsoft.com/office/drawing/2014/main" id="{3C96B79B-B5E7-0F58-3245-CC39DAEE8C77}"/>
+              </a:ext>
+            </a:extLst>
+          </p:cNvPr>
+          <p:cNvSpPr>
+            <a:spLocks noGrp="1"/>
+          </p:cNvSpPr>
+          <p:nvPr>
+            <p:ph type="body" idx="1"/>
+          </p:nvPr>
+        </p:nvSpPr>
+        <p:spPr/>
+        <p:txBody>
+          <a:bodyPr/>
+          <a:lstStyle/>
+          <a:p>
+            <a:pPr marL="171450" marR="0" lvl="0" indent="-171450" algn="l" defTabSz="914400" rtl="0" eaLnBrk="1" fontAlgn="auto" latinLnBrk="0" hangingPunct="1">
+              <a:lnSpc>
+                <a:spcPct val="100000"/>
+              </a:lnSpc>
+              <a:spcBef>
+                <a:spcPts val="0"/>
+              </a:spcBef>
+              <a:spcAft>
+                <a:spcPts val="0"/>
+              </a:spcAft>
+              <a:buClrTx/>
+              <a:buSzTx/>
+              <a:buFontTx/>
+              <a:buChar char="-"/>
+              <a:tabLst/>
+              <a:defRPr/>
+            </a:pPr>
+            <a:r>
+              <a:rPr lang="en-GB" b="1" dirty="0">
+                <a:cs typeface="Consolas" panose="020B0609020204030204" pitchFamily="49" charset="0"/>
+              </a:rPr>
+              <a:t>Improved dependency resolution – resolution algorithm has been tuned, leading to faster resolution and reduced overhead</a:t>
+            </a:r>
+          </a:p>
+          <a:p>
+            <a:pPr marL="171450" marR="0" lvl="0" indent="-171450" algn="l" defTabSz="914400" rtl="0" eaLnBrk="1" fontAlgn="auto" latinLnBrk="0" hangingPunct="1">
+              <a:lnSpc>
+                <a:spcPct val="100000"/>
+              </a:lnSpc>
+              <a:spcBef>
+                <a:spcPts val="0"/>
+              </a:spcBef>
+              <a:spcAft>
+                <a:spcPts val="0"/>
+              </a:spcAft>
+              <a:buClrTx/>
+              <a:buSzTx/>
+              <a:buFontTx/>
+              <a:buChar char="-"/>
+              <a:tabLst/>
+              <a:defRPr/>
+            </a:pPr>
+            <a:r>
+              <a:rPr lang="en-GB" b="1" dirty="0">
+                <a:cs typeface="Consolas" panose="020B0609020204030204" pitchFamily="49" charset="0"/>
+              </a:rPr>
+              <a:t>Reduced memory consumption – makes it more efficient especially in resource-constrained environments</a:t>
+            </a:r>
+          </a:p>
+          <a:p>
+            <a:pPr marL="171450" marR="0" lvl="0" indent="-171450" algn="l" defTabSz="914400" rtl="0" eaLnBrk="1" fontAlgn="auto" latinLnBrk="0" hangingPunct="1">
+              <a:lnSpc>
+                <a:spcPct val="100000"/>
+              </a:lnSpc>
+              <a:spcBef>
+                <a:spcPts val="0"/>
+              </a:spcBef>
+              <a:spcAft>
+                <a:spcPts val="0"/>
+              </a:spcAft>
+              <a:buClrTx/>
+              <a:buSzTx/>
+              <a:buFontTx/>
+              <a:buChar char="-"/>
+              <a:tabLst/>
+              <a:defRPr/>
+            </a:pPr>
+            <a:r>
+              <a:rPr lang="en-GB" b="1" dirty="0">
+                <a:cs typeface="Consolas" panose="020B0609020204030204" pitchFamily="49" charset="0"/>
+              </a:rPr>
+              <a:t>Incremental build improvements – smarter about detecting changes and rebuilding necessary modules, reducing build times</a:t>
+            </a:r>
+          </a:p>
+          <a:p>
+            <a:pPr marL="171450" indent="-171450">
+              <a:buFontTx/>
+              <a:buChar char="-"/>
+            </a:pPr>
+            <a:endParaRPr lang="en-US" dirty="0"/>
+          </a:p>
+        </p:txBody>
+      </p:sp>
+      <p:sp>
+        <p:nvSpPr>
+          <p:cNvPr id="4" name="Slide Number Placeholder 3">
+            <a:extLst>
+              <a:ext uri="{FF2B5EF4-FFF2-40B4-BE49-F238E27FC236}">
+                <a16:creationId xmlns:a16="http://schemas.microsoft.com/office/drawing/2014/main" id="{62BBF9A9-B378-5A51-51D9-A29B6C24E183}"/>
+              </a:ext>
+            </a:extLst>
+          </p:cNvPr>
+          <p:cNvSpPr>
+            <a:spLocks noGrp="1"/>
+          </p:cNvSpPr>
+          <p:nvPr>
+            <p:ph type="sldNum" sz="quarter" idx="5"/>
+          </p:nvPr>
+        </p:nvSpPr>
+        <p:spPr/>
+        <p:txBody>
+          <a:bodyPr/>
+          <a:lstStyle/>
+          <a:p>
+            <a:fld id="{0B1A8FFB-CB5A-5744-992F-509A4FA86679}" type="slidenum">
+              <a:rPr lang="en-US" smtClean="0"/>
+              <a:t>23</a:t>
+            </a:fld>
+            <a:endParaRPr lang="en-US"/>
+          </a:p>
+        </p:txBody>
+      </p:sp>
+    </p:spTree>
+    <p:extLst>
+      <p:ext uri="{BB962C8B-B14F-4D97-AF65-F5344CB8AC3E}">
+        <p14:creationId xmlns:p14="http://schemas.microsoft.com/office/powerpoint/2010/main" val="2415998503"/>
+      </p:ext>
+    </p:extLst>
+  </p:cSld>
+  <p:clrMapOvr>
+    <a:masterClrMapping/>
+  </p:clrMapOvr>
+</p:notes>
+</file>
+
+<file path=ppt/notesSlides/notesSlide18.xml><?xml version="1.0" encoding="utf-8"?>
+<p:notes xmlns:a="http://schemas.openxmlformats.org/drawingml/2006/main" xmlns:r="http://schemas.openxmlformats.org/officeDocument/2006/relationships" xmlns:p="http://schemas.openxmlformats.org/presentationml/2006/main">
+  <p:cSld>
+    <p:spTree>
+      <p:nvGrpSpPr>
         <p:cNvPr id="1" name=""/>
         <p:cNvGrpSpPr/>
         <p:nvPr/>
@@ -5352,7 +5540,7 @@
           <a:p>
             <a:fld id="{0B1A8FFB-CB5A-5744-992F-509A4FA86679}" type="slidenum">
               <a:rPr lang="en-US" smtClean="0"/>
-              <a:t>23</a:t>
+              <a:t>24</a:t>
             </a:fld>
             <a:endParaRPr lang="en-US"/>
           </a:p>
@@ -5371,7 +5559,7 @@
 </p:notes>
 </file>
 
-<file path=ppt/notesSlides/notesSlide18.xml><?xml version="1.0" encoding="utf-8"?>
+<file path=ppt/notesSlides/notesSlide19.xml><?xml version="1.0" encoding="utf-8"?>
 <p:notes xmlns:a="http://schemas.openxmlformats.org/drawingml/2006/main" xmlns:r="http://schemas.openxmlformats.org/officeDocument/2006/relationships" xmlns:p="http://schemas.openxmlformats.org/presentationml/2006/main">
   <p:cSld>
     <p:spTree>
@@ -5464,7 +5652,7 @@
           <a:p>
             <a:fld id="{0B1A8FFB-CB5A-5744-992F-509A4FA86679}" type="slidenum">
               <a:rPr lang="en-US" smtClean="0"/>
-              <a:t>24</a:t>
+              <a:t>25</a:t>
             </a:fld>
             <a:endParaRPr lang="en-US"/>
           </a:p>
@@ -5474,90 +5662,6 @@
     <p:extLst>
       <p:ext uri="{BB962C8B-B14F-4D97-AF65-F5344CB8AC3E}">
         <p14:creationId xmlns:p14="http://schemas.microsoft.com/office/powerpoint/2010/main" val="3184583322"/>
-      </p:ext>
-    </p:extLst>
-  </p:cSld>
-  <p:clrMapOvr>
-    <a:masterClrMapping/>
-  </p:clrMapOvr>
-</p:notes>
-</file>
-
-<file path=ppt/notesSlides/notesSlide19.xml><?xml version="1.0" encoding="utf-8"?>
-<p:notes xmlns:a="http://schemas.openxmlformats.org/drawingml/2006/main" xmlns:r="http://schemas.openxmlformats.org/officeDocument/2006/relationships" xmlns:p="http://schemas.openxmlformats.org/presentationml/2006/main">
-  <p:cSld>
-    <p:spTree>
-      <p:nvGrpSpPr>
-        <p:cNvPr id="1" name=""/>
-        <p:cNvGrpSpPr/>
-        <p:nvPr/>
-      </p:nvGrpSpPr>
-      <p:grpSpPr>
-        <a:xfrm>
-          <a:off x="0" y="0"/>
-          <a:ext cx="0" cy="0"/>
-          <a:chOff x="0" y="0"/>
-          <a:chExt cx="0" cy="0"/>
-        </a:xfrm>
-      </p:grpSpPr>
-      <p:sp>
-        <p:nvSpPr>
-          <p:cNvPr id="2" name="Slide Image Placeholder 1"/>
-          <p:cNvSpPr>
-            <a:spLocks noGrp="1" noRot="1" noChangeAspect="1"/>
-          </p:cNvSpPr>
-          <p:nvPr>
-            <p:ph type="sldImg"/>
-          </p:nvPr>
-        </p:nvSpPr>
-        <p:spPr/>
-      </p:sp>
-      <p:sp>
-        <p:nvSpPr>
-          <p:cNvPr id="3" name="Notes Placeholder 2"/>
-          <p:cNvSpPr>
-            <a:spLocks noGrp="1"/>
-          </p:cNvSpPr>
-          <p:nvPr>
-            <p:ph type="body" idx="1"/>
-          </p:nvPr>
-        </p:nvSpPr>
-        <p:spPr/>
-        <p:txBody>
-          <a:bodyPr/>
-          <a:lstStyle/>
-          <a:p>
-            <a:endParaRPr lang="en-US" dirty="0"/>
-          </a:p>
-        </p:txBody>
-      </p:sp>
-      <p:sp>
-        <p:nvSpPr>
-          <p:cNvPr id="4" name="Slide Number Placeholder 3"/>
-          <p:cNvSpPr>
-            <a:spLocks noGrp="1"/>
-          </p:cNvSpPr>
-          <p:nvPr>
-            <p:ph type="sldNum" sz="quarter" idx="5"/>
-          </p:nvPr>
-        </p:nvSpPr>
-        <p:spPr/>
-        <p:txBody>
-          <a:bodyPr/>
-          <a:lstStyle/>
-          <a:p>
-            <a:fld id="{0B1A8FFB-CB5A-5744-992F-509A4FA86679}" type="slidenum">
-              <a:rPr lang="en-US" smtClean="0"/>
-              <a:t>25</a:t>
-            </a:fld>
-            <a:endParaRPr lang="en-US"/>
-          </a:p>
-        </p:txBody>
-      </p:sp>
-    </p:spTree>
-    <p:extLst>
-      <p:ext uri="{BB962C8B-B14F-4D97-AF65-F5344CB8AC3E}">
-        <p14:creationId xmlns:p14="http://schemas.microsoft.com/office/powerpoint/2010/main" val="437442549"/>
       </p:ext>
     </p:extLst>
   </p:cSld>
@@ -5645,6 +5749,90 @@
     <p:extLst>
       <p:ext uri="{BB962C8B-B14F-4D97-AF65-F5344CB8AC3E}">
         <p14:creationId xmlns:p14="http://schemas.microsoft.com/office/powerpoint/2010/main" val="669307061"/>
+      </p:ext>
+    </p:extLst>
+  </p:cSld>
+  <p:clrMapOvr>
+    <a:masterClrMapping/>
+  </p:clrMapOvr>
+</p:notes>
+</file>
+
+<file path=ppt/notesSlides/notesSlide20.xml><?xml version="1.0" encoding="utf-8"?>
+<p:notes xmlns:a="http://schemas.openxmlformats.org/drawingml/2006/main" xmlns:r="http://schemas.openxmlformats.org/officeDocument/2006/relationships" xmlns:p="http://schemas.openxmlformats.org/presentationml/2006/main">
+  <p:cSld>
+    <p:spTree>
+      <p:nvGrpSpPr>
+        <p:cNvPr id="1" name=""/>
+        <p:cNvGrpSpPr/>
+        <p:nvPr/>
+      </p:nvGrpSpPr>
+      <p:grpSpPr>
+        <a:xfrm>
+          <a:off x="0" y="0"/>
+          <a:ext cx="0" cy="0"/>
+          <a:chOff x="0" y="0"/>
+          <a:chExt cx="0" cy="0"/>
+        </a:xfrm>
+      </p:grpSpPr>
+      <p:sp>
+        <p:nvSpPr>
+          <p:cNvPr id="2" name="Slide Image Placeholder 1"/>
+          <p:cNvSpPr>
+            <a:spLocks noGrp="1" noRot="1" noChangeAspect="1"/>
+          </p:cNvSpPr>
+          <p:nvPr>
+            <p:ph type="sldImg"/>
+          </p:nvPr>
+        </p:nvSpPr>
+        <p:spPr/>
+      </p:sp>
+      <p:sp>
+        <p:nvSpPr>
+          <p:cNvPr id="3" name="Notes Placeholder 2"/>
+          <p:cNvSpPr>
+            <a:spLocks noGrp="1"/>
+          </p:cNvSpPr>
+          <p:nvPr>
+            <p:ph type="body" idx="1"/>
+          </p:nvPr>
+        </p:nvSpPr>
+        <p:spPr/>
+        <p:txBody>
+          <a:bodyPr/>
+          <a:lstStyle/>
+          <a:p>
+            <a:endParaRPr lang="en-US" dirty="0"/>
+          </a:p>
+        </p:txBody>
+      </p:sp>
+      <p:sp>
+        <p:nvSpPr>
+          <p:cNvPr id="4" name="Slide Number Placeholder 3"/>
+          <p:cNvSpPr>
+            <a:spLocks noGrp="1"/>
+          </p:cNvSpPr>
+          <p:nvPr>
+            <p:ph type="sldNum" sz="quarter" idx="5"/>
+          </p:nvPr>
+        </p:nvSpPr>
+        <p:spPr/>
+        <p:txBody>
+          <a:bodyPr/>
+          <a:lstStyle/>
+          <a:p>
+            <a:fld id="{0B1A8FFB-CB5A-5744-992F-509A4FA86679}" type="slidenum">
+              <a:rPr lang="en-US" smtClean="0"/>
+              <a:t>26</a:t>
+            </a:fld>
+            <a:endParaRPr lang="en-US"/>
+          </a:p>
+        </p:txBody>
+      </p:sp>
+    </p:spTree>
+    <p:extLst>
+      <p:ext uri="{BB962C8B-B14F-4D97-AF65-F5344CB8AC3E}">
+        <p14:creationId xmlns:p14="http://schemas.microsoft.com/office/powerpoint/2010/main" val="437442549"/>
       </p:ext>
     </p:extLst>
   </p:cSld>
@@ -6610,7 +6798,7 @@
           <a:p>
             <a:fld id="{4AAD347D-5ACD-4C99-B74B-A9C85AD731AF}" type="datetimeFigureOut">
               <a:rPr lang="en-US" dirty="0"/>
-              <a:t>11/25/25</a:t>
+              <a:t>11/26/25</a:t>
             </a:fld>
             <a:endParaRPr lang="en-US" dirty="0"/>
           </a:p>
@@ -6880,7 +7068,7 @@
           <a:p>
             <a:fld id="{4509A250-FF31-4206-8172-F9D3106AACB1}" type="datetimeFigureOut">
               <a:rPr lang="en-US" dirty="0"/>
-              <a:t>11/25/25</a:t>
+              <a:t>11/26/25</a:t>
             </a:fld>
             <a:endParaRPr lang="en-US" dirty="0"/>
           </a:p>
@@ -7069,7 +7257,7 @@
           <a:p>
             <a:fld id="{4509A250-FF31-4206-8172-F9D3106AACB1}" type="datetimeFigureOut">
               <a:rPr lang="en-US" dirty="0"/>
-              <a:t>11/25/25</a:t>
+              <a:t>11/26/25</a:t>
             </a:fld>
             <a:endParaRPr lang="en-US" dirty="0"/>
           </a:p>
@@ -7337,7 +7525,7 @@
           <a:p>
             <a:fld id="{4509A250-FF31-4206-8172-F9D3106AACB1}" type="datetimeFigureOut">
               <a:rPr lang="en-US" dirty="0"/>
-              <a:t>11/25/25</a:t>
+              <a:t>11/26/25</a:t>
             </a:fld>
             <a:endParaRPr lang="en-US" dirty="0"/>
           </a:p>
@@ -7673,7 +7861,7 @@
           <a:p>
             <a:fld id="{4509A250-FF31-4206-8172-F9D3106AACB1}" type="datetimeFigureOut">
               <a:rPr lang="en-US" dirty="0"/>
-              <a:t>11/25/25</a:t>
+              <a:t>11/26/25</a:t>
             </a:fld>
             <a:endParaRPr lang="en-US" dirty="0"/>
           </a:p>
@@ -8291,7 +8479,7 @@
           <a:p>
             <a:fld id="{4509A250-FF31-4206-8172-F9D3106AACB1}" type="datetimeFigureOut">
               <a:rPr lang="en-US" dirty="0"/>
-              <a:t>11/25/25</a:t>
+              <a:t>11/26/25</a:t>
             </a:fld>
             <a:endParaRPr lang="en-US" dirty="0"/>
           </a:p>
@@ -9146,7 +9334,7 @@
           <a:p>
             <a:fld id="{4509A250-FF31-4206-8172-F9D3106AACB1}" type="datetimeFigureOut">
               <a:rPr lang="en-US" dirty="0"/>
-              <a:t>11/25/25</a:t>
+              <a:t>11/26/25</a:t>
             </a:fld>
             <a:endParaRPr lang="en-US" dirty="0"/>
           </a:p>
@@ -9311,7 +9499,7 @@
           <a:p>
             <a:fld id="{4509A250-FF31-4206-8172-F9D3106AACB1}" type="datetimeFigureOut">
               <a:rPr lang="en-US" dirty="0"/>
-              <a:t>11/25/25</a:t>
+              <a:t>11/26/25</a:t>
             </a:fld>
             <a:endParaRPr lang="en-US" dirty="0"/>
           </a:p>
@@ -9486,7 +9674,7 @@
           <a:p>
             <a:fld id="{4509A250-FF31-4206-8172-F9D3106AACB1}" type="datetimeFigureOut">
               <a:rPr lang="en-US" dirty="0"/>
-              <a:t>11/25/25</a:t>
+              <a:t>11/26/25</a:t>
             </a:fld>
             <a:endParaRPr lang="en-US" dirty="0"/>
           </a:p>
@@ -9651,7 +9839,7 @@
           <a:p>
             <a:fld id="{4509A250-FF31-4206-8172-F9D3106AACB1}" type="datetimeFigureOut">
               <a:rPr lang="en-US" dirty="0"/>
-              <a:t>11/25/25</a:t>
+              <a:t>11/26/25</a:t>
             </a:fld>
             <a:endParaRPr lang="en-US" dirty="0"/>
           </a:p>
@@ -9893,7 +10081,7 @@
           <a:p>
             <a:fld id="{9796027F-7875-4030-9381-8BD8C4F21935}" type="datetimeFigureOut">
               <a:rPr lang="en-US" dirty="0"/>
-              <a:t>11/25/25</a:t>
+              <a:t>11/26/25</a:t>
             </a:fld>
             <a:endParaRPr lang="en-US" dirty="0"/>
           </a:p>
@@ -10180,7 +10368,7 @@
           <a:p>
             <a:fld id="{9796027F-7875-4030-9381-8BD8C4F21935}" type="datetimeFigureOut">
               <a:rPr lang="en-US" dirty="0"/>
-              <a:t>11/25/25</a:t>
+              <a:t>11/26/25</a:t>
             </a:fld>
             <a:endParaRPr lang="en-US" dirty="0"/>
           </a:p>
@@ -10619,7 +10807,7 @@
           <a:p>
             <a:fld id="{9796027F-7875-4030-9381-8BD8C4F21935}" type="datetimeFigureOut">
               <a:rPr lang="en-US" dirty="0"/>
-              <a:t>11/25/25</a:t>
+              <a:t>11/26/25</a:t>
             </a:fld>
             <a:endParaRPr lang="en-US" dirty="0"/>
           </a:p>
@@ -10732,7 +10920,7 @@
           <a:p>
             <a:fld id="{4509A250-FF31-4206-8172-F9D3106AACB1}" type="datetimeFigureOut">
               <a:rPr lang="en-US" dirty="0"/>
-              <a:t>11/25/25</a:t>
+              <a:t>11/26/25</a:t>
             </a:fld>
             <a:endParaRPr lang="en-US" dirty="0"/>
           </a:p>
@@ -10822,7 +11010,7 @@
           <a:p>
             <a:fld id="{4509A250-FF31-4206-8172-F9D3106AACB1}" type="datetimeFigureOut">
               <a:rPr lang="en-US" dirty="0"/>
-              <a:t>11/25/25</a:t>
+              <a:t>11/26/25</a:t>
             </a:fld>
             <a:endParaRPr lang="en-US" dirty="0"/>
           </a:p>
@@ -11096,7 +11284,7 @@
           <a:p>
             <a:fld id="{4509A250-FF31-4206-8172-F9D3106AACB1}" type="datetimeFigureOut">
               <a:rPr lang="en-US" dirty="0"/>
-              <a:t>11/25/25</a:t>
+              <a:t>11/26/25</a:t>
             </a:fld>
             <a:endParaRPr lang="en-US" dirty="0"/>
           </a:p>
@@ -11366,7 +11554,7 @@
           <a:p>
             <a:fld id="{4509A250-FF31-4206-8172-F9D3106AACB1}" type="datetimeFigureOut">
               <a:rPr lang="en-US" dirty="0"/>
-              <a:t>11/25/25</a:t>
+              <a:t>11/26/25</a:t>
             </a:fld>
             <a:endParaRPr lang="en-US" dirty="0"/>
           </a:p>
@@ -11804,7 +11992,7 @@
           <a:p>
             <a:fld id="{4AAD347D-5ACD-4C99-B74B-A9C85AD731AF}" type="datetimeFigureOut">
               <a:rPr lang="en-US" dirty="0"/>
-              <a:t>11/25/25</a:t>
+              <a:t>11/26/25</a:t>
             </a:fld>
             <a:endParaRPr lang="en-US" dirty="0"/>
           </a:p>
@@ -16332,6 +16520,143 @@
   <p:cSld>
     <p:spTree>
       <p:nvGrpSpPr>
+        <p:cNvPr id="1" name="">
+          <a:extLst>
+            <a:ext uri="{FF2B5EF4-FFF2-40B4-BE49-F238E27FC236}">
+              <a16:creationId xmlns:a16="http://schemas.microsoft.com/office/drawing/2014/main" id="{3B8FDCE3-3328-EB67-A98A-69BFB5ECC14F}"/>
+            </a:ext>
+          </a:extLst>
+        </p:cNvPr>
+        <p:cNvGrpSpPr/>
+        <p:nvPr/>
+      </p:nvGrpSpPr>
+      <p:grpSpPr>
+        <a:xfrm>
+          <a:off x="0" y="0"/>
+          <a:ext cx="0" cy="0"/>
+          <a:chOff x="0" y="0"/>
+          <a:chExt cx="0" cy="0"/>
+        </a:xfrm>
+      </p:grpSpPr>
+      <p:sp>
+        <p:nvSpPr>
+          <p:cNvPr id="2" name="Title 1">
+            <a:extLst>
+              <a:ext uri="{FF2B5EF4-FFF2-40B4-BE49-F238E27FC236}">
+                <a16:creationId xmlns:a16="http://schemas.microsoft.com/office/drawing/2014/main" id="{76762B30-CF3C-B4B7-24C7-F239FBF8515E}"/>
+              </a:ext>
+            </a:extLst>
+          </p:cNvPr>
+          <p:cNvSpPr>
+            <a:spLocks noGrp="1"/>
+          </p:cNvSpPr>
+          <p:nvPr>
+            <p:ph type="title"/>
+          </p:nvPr>
+        </p:nvSpPr>
+        <p:spPr/>
+        <p:txBody>
+          <a:bodyPr/>
+          <a:lstStyle/>
+          <a:p>
+            <a:r>
+              <a:rPr lang="en-US" dirty="0"/>
+              <a:t>Maven 4 – Performance Boosts</a:t>
+            </a:r>
+          </a:p>
+        </p:txBody>
+      </p:sp>
+      <p:sp>
+        <p:nvSpPr>
+          <p:cNvPr id="3" name="Content Placeholder 2">
+            <a:extLst>
+              <a:ext uri="{FF2B5EF4-FFF2-40B4-BE49-F238E27FC236}">
+                <a16:creationId xmlns:a16="http://schemas.microsoft.com/office/drawing/2014/main" id="{C6B4CD5A-CB71-D91F-8546-391435CDE23C}"/>
+              </a:ext>
+            </a:extLst>
+          </p:cNvPr>
+          <p:cNvSpPr>
+            <a:spLocks noGrp="1"/>
+          </p:cNvSpPr>
+          <p:nvPr>
+            <p:ph idx="1"/>
+          </p:nvPr>
+        </p:nvSpPr>
+        <p:spPr>
+          <a:xfrm>
+            <a:off x="645130" y="1622738"/>
+            <a:ext cx="10507974" cy="4625661"/>
+          </a:xfrm>
+        </p:spPr>
+        <p:txBody>
+          <a:bodyPr>
+            <a:normAutofit/>
+          </a:bodyPr>
+          <a:lstStyle/>
+          <a:p>
+            <a:r>
+              <a:rPr lang="en-GB" sz="2800" dirty="0">
+                <a:cs typeface="Consolas" panose="020B0609020204030204" pitchFamily="49" charset="0"/>
+              </a:rPr>
+              <a:t>Faster build times especially for large multi-module projects</a:t>
+            </a:r>
+          </a:p>
+          <a:p>
+            <a:pPr lvl="1"/>
+            <a:r>
+              <a:rPr lang="en-GB" sz="2400" dirty="0">
+                <a:cs typeface="Consolas" panose="020B0609020204030204" pitchFamily="49" charset="0"/>
+              </a:rPr>
+              <a:t>Improved dependency resolution</a:t>
+            </a:r>
+          </a:p>
+          <a:p>
+            <a:pPr lvl="1"/>
+            <a:r>
+              <a:rPr lang="en-GB" sz="2400" dirty="0">
+                <a:cs typeface="Consolas" panose="020B0609020204030204" pitchFamily="49" charset="0"/>
+              </a:rPr>
+              <a:t>Parallel build enhancements (better use of multi-core processors)</a:t>
+            </a:r>
+          </a:p>
+          <a:p>
+            <a:pPr lvl="1"/>
+            <a:r>
+              <a:rPr lang="en-GB" sz="2400" dirty="0">
+                <a:cs typeface="Consolas" panose="020B0609020204030204" pitchFamily="49" charset="0"/>
+              </a:rPr>
+              <a:t>Reduced memory consumption</a:t>
+            </a:r>
+          </a:p>
+          <a:p>
+            <a:pPr lvl="1"/>
+            <a:r>
+              <a:rPr lang="en-GB" sz="2400" dirty="0">
+                <a:cs typeface="Consolas" panose="020B0609020204030204" pitchFamily="49" charset="0"/>
+              </a:rPr>
+              <a:t>Incremental build improvements</a:t>
+            </a:r>
+          </a:p>
+        </p:txBody>
+      </p:sp>
+    </p:spTree>
+    <p:extLst>
+      <p:ext uri="{BB962C8B-B14F-4D97-AF65-F5344CB8AC3E}">
+        <p14:creationId xmlns:p14="http://schemas.microsoft.com/office/powerpoint/2010/main" val="3652527991"/>
+      </p:ext>
+    </p:extLst>
+  </p:cSld>
+  <p:clrMapOvr>
+    <a:masterClrMapping/>
+  </p:clrMapOvr>
+</p:sld>
+</file>
+
+<file path=ppt/slides/slide24.xml><?xml version="1.0" encoding="utf-8"?>
+<p:sld xmlns:a="http://schemas.openxmlformats.org/drawingml/2006/main" xmlns:r="http://schemas.openxmlformats.org/officeDocument/2006/relationships" xmlns:p="http://schemas.openxmlformats.org/presentationml/2006/main">
+  <p:cSld>
+    <p:spTree>
+      <p:nvGrpSpPr>
         <p:cNvPr id="1" name=""/>
         <p:cNvGrpSpPr/>
         <p:nvPr/>
@@ -16512,7 +16837,7 @@
 </p:sld>
 </file>
 
-<file path=ppt/slides/slide24.xml><?xml version="1.0" encoding="utf-8"?>
+<file path=ppt/slides/slide25.xml><?xml version="1.0" encoding="utf-8"?>
 <p:sld xmlns:a="http://schemas.openxmlformats.org/drawingml/2006/main" xmlns:r="http://schemas.openxmlformats.org/officeDocument/2006/relationships" xmlns:p="http://schemas.openxmlformats.org/presentationml/2006/main">
   <p:cSld>
     <p:spTree>
@@ -16725,7 +17050,7 @@
 </p:sld>
 </file>
 
-<file path=ppt/slides/slide25.xml><?xml version="1.0" encoding="utf-8"?>
+<file path=ppt/slides/slide26.xml><?xml version="1.0" encoding="utf-8"?>
 <p:sld xmlns:a="http://schemas.openxmlformats.org/drawingml/2006/main" xmlns:r="http://schemas.openxmlformats.org/officeDocument/2006/relationships" xmlns:p="http://schemas.openxmlformats.org/presentationml/2006/main">
   <p:cSld>
     <p:bg>
@@ -18128,7 +18453,7 @@
 </p:sld>
 </file>
 
-<file path=ppt/slides/slide26.xml><?xml version="1.0" encoding="utf-8"?>
+<file path=ppt/slides/slide27.xml><?xml version="1.0" encoding="utf-8"?>
 <p:sld xmlns:a="http://schemas.openxmlformats.org/drawingml/2006/main" xmlns:r="http://schemas.openxmlformats.org/officeDocument/2006/relationships" xmlns:p="http://schemas.openxmlformats.org/presentationml/2006/main">
   <p:cSld>
     <p:spTree>
@@ -18257,7 +18582,7 @@
 </p:sld>
 </file>
 
-<file path=ppt/slides/slide27.xml><?xml version="1.0" encoding="utf-8"?>
+<file path=ppt/slides/slide28.xml><?xml version="1.0" encoding="utf-8"?>
 <p:sld xmlns:a="http://schemas.openxmlformats.org/drawingml/2006/main" xmlns:r="http://schemas.openxmlformats.org/officeDocument/2006/relationships" xmlns:p="http://schemas.openxmlformats.org/presentationml/2006/main">
   <p:cSld>
     <p:bg>
@@ -19427,7 +19752,7 @@
 </p:sld>
 </file>
 
-<file path=ppt/slides/slide28.xml><?xml version="1.0" encoding="utf-8"?>
+<file path=ppt/slides/slide29.xml><?xml version="1.0" encoding="utf-8"?>
 <p:sld xmlns:a="http://schemas.openxmlformats.org/drawingml/2006/main" xmlns:r="http://schemas.openxmlformats.org/officeDocument/2006/relationships" xmlns:p="http://schemas.openxmlformats.org/presentationml/2006/main">
   <p:cSld>
     <p:spTree>
@@ -19513,101 +19838,6 @@
     <p:extLst>
       <p:ext uri="{BB962C8B-B14F-4D97-AF65-F5344CB8AC3E}">
         <p14:creationId xmlns:p14="http://schemas.microsoft.com/office/powerpoint/2010/main" val="2247574082"/>
-      </p:ext>
-    </p:extLst>
-  </p:cSld>
-  <p:clrMapOvr>
-    <a:masterClrMapping/>
-  </p:clrMapOvr>
-</p:sld>
-</file>
-
-<file path=ppt/slides/slide29.xml><?xml version="1.0" encoding="utf-8"?>
-<p:sld xmlns:a="http://schemas.openxmlformats.org/drawingml/2006/main" xmlns:r="http://schemas.openxmlformats.org/officeDocument/2006/relationships" xmlns:p="http://schemas.openxmlformats.org/presentationml/2006/main">
-  <p:cSld>
-    <p:spTree>
-      <p:nvGrpSpPr>
-        <p:cNvPr id="1" name="">
-          <a:extLst>
-            <a:ext uri="{FF2B5EF4-FFF2-40B4-BE49-F238E27FC236}">
-              <a16:creationId xmlns:a16="http://schemas.microsoft.com/office/drawing/2014/main" id="{2A16D755-B15E-6154-73BE-EDCE7C874876}"/>
-            </a:ext>
-          </a:extLst>
-        </p:cNvPr>
-        <p:cNvGrpSpPr/>
-        <p:nvPr/>
-      </p:nvGrpSpPr>
-      <p:grpSpPr>
-        <a:xfrm>
-          <a:off x="0" y="0"/>
-          <a:ext cx="0" cy="0"/>
-          <a:chOff x="0" y="0"/>
-          <a:chExt cx="0" cy="0"/>
-        </a:xfrm>
-      </p:grpSpPr>
-      <p:sp>
-        <p:nvSpPr>
-          <p:cNvPr id="2" name="Title 1">
-            <a:extLst>
-              <a:ext uri="{FF2B5EF4-FFF2-40B4-BE49-F238E27FC236}">
-                <a16:creationId xmlns:a16="http://schemas.microsoft.com/office/drawing/2014/main" id="{BE88B9FC-9502-9AE4-8A81-5B03937ABD23}"/>
-              </a:ext>
-            </a:extLst>
-          </p:cNvPr>
-          <p:cNvSpPr>
-            <a:spLocks noGrp="1"/>
-          </p:cNvSpPr>
-          <p:nvPr>
-            <p:ph type="title"/>
-          </p:nvPr>
-        </p:nvSpPr>
-        <p:spPr/>
-        <p:txBody>
-          <a:bodyPr/>
-          <a:lstStyle/>
-          <a:p>
-            <a:r>
-              <a:rPr lang="en-US" dirty="0"/>
-              <a:t>Module Import Declarations</a:t>
-            </a:r>
-          </a:p>
-        </p:txBody>
-      </p:sp>
-      <p:sp>
-        <p:nvSpPr>
-          <p:cNvPr id="3" name="Content Placeholder 2">
-            <a:extLst>
-              <a:ext uri="{FF2B5EF4-FFF2-40B4-BE49-F238E27FC236}">
-                <a16:creationId xmlns:a16="http://schemas.microsoft.com/office/drawing/2014/main" id="{309608D4-D424-A97C-82D4-663203346326}"/>
-              </a:ext>
-            </a:extLst>
-          </p:cNvPr>
-          <p:cNvSpPr>
-            <a:spLocks noGrp="1"/>
-          </p:cNvSpPr>
-          <p:nvPr>
-            <p:ph idx="1"/>
-          </p:nvPr>
-        </p:nvSpPr>
-        <p:spPr/>
-        <p:txBody>
-          <a:bodyPr>
-            <a:normAutofit/>
-          </a:bodyPr>
-          <a:lstStyle/>
-          <a:p>
-            <a:pPr lvl="1"/>
-            <a:r>
-              <a:rPr lang="en-US" sz="2600" dirty="0"/>
-              <a:t># TODO</a:t>
-            </a:r>
-          </a:p>
-        </p:txBody>
-      </p:sp>
-    </p:spTree>
-    <p:extLst>
-      <p:ext uri="{BB962C8B-B14F-4D97-AF65-F5344CB8AC3E}">
-        <p14:creationId xmlns:p14="http://schemas.microsoft.com/office/powerpoint/2010/main" val="829147350"/>
       </p:ext>
     </p:extLst>
   </p:cSld>
@@ -21035,6 +21265,101 @@
         <p:cNvPr id="1" name="">
           <a:extLst>
             <a:ext uri="{FF2B5EF4-FFF2-40B4-BE49-F238E27FC236}">
+              <a16:creationId xmlns:a16="http://schemas.microsoft.com/office/drawing/2014/main" id="{2A16D755-B15E-6154-73BE-EDCE7C874876}"/>
+            </a:ext>
+          </a:extLst>
+        </p:cNvPr>
+        <p:cNvGrpSpPr/>
+        <p:nvPr/>
+      </p:nvGrpSpPr>
+      <p:grpSpPr>
+        <a:xfrm>
+          <a:off x="0" y="0"/>
+          <a:ext cx="0" cy="0"/>
+          <a:chOff x="0" y="0"/>
+          <a:chExt cx="0" cy="0"/>
+        </a:xfrm>
+      </p:grpSpPr>
+      <p:sp>
+        <p:nvSpPr>
+          <p:cNvPr id="2" name="Title 1">
+            <a:extLst>
+              <a:ext uri="{FF2B5EF4-FFF2-40B4-BE49-F238E27FC236}">
+                <a16:creationId xmlns:a16="http://schemas.microsoft.com/office/drawing/2014/main" id="{BE88B9FC-9502-9AE4-8A81-5B03937ABD23}"/>
+              </a:ext>
+            </a:extLst>
+          </p:cNvPr>
+          <p:cNvSpPr>
+            <a:spLocks noGrp="1"/>
+          </p:cNvSpPr>
+          <p:nvPr>
+            <p:ph type="title"/>
+          </p:nvPr>
+        </p:nvSpPr>
+        <p:spPr/>
+        <p:txBody>
+          <a:bodyPr/>
+          <a:lstStyle/>
+          <a:p>
+            <a:r>
+              <a:rPr lang="en-US" dirty="0"/>
+              <a:t>Module Import Declarations</a:t>
+            </a:r>
+          </a:p>
+        </p:txBody>
+      </p:sp>
+      <p:sp>
+        <p:nvSpPr>
+          <p:cNvPr id="3" name="Content Placeholder 2">
+            <a:extLst>
+              <a:ext uri="{FF2B5EF4-FFF2-40B4-BE49-F238E27FC236}">
+                <a16:creationId xmlns:a16="http://schemas.microsoft.com/office/drawing/2014/main" id="{309608D4-D424-A97C-82D4-663203346326}"/>
+              </a:ext>
+            </a:extLst>
+          </p:cNvPr>
+          <p:cNvSpPr>
+            <a:spLocks noGrp="1"/>
+          </p:cNvSpPr>
+          <p:nvPr>
+            <p:ph idx="1"/>
+          </p:nvPr>
+        </p:nvSpPr>
+        <p:spPr/>
+        <p:txBody>
+          <a:bodyPr>
+            <a:normAutofit/>
+          </a:bodyPr>
+          <a:lstStyle/>
+          <a:p>
+            <a:pPr lvl="1"/>
+            <a:r>
+              <a:rPr lang="en-US" sz="2600" dirty="0"/>
+              <a:t># TODO</a:t>
+            </a:r>
+          </a:p>
+        </p:txBody>
+      </p:sp>
+    </p:spTree>
+    <p:extLst>
+      <p:ext uri="{BB962C8B-B14F-4D97-AF65-F5344CB8AC3E}">
+        <p14:creationId xmlns:p14="http://schemas.microsoft.com/office/powerpoint/2010/main" val="829147350"/>
+      </p:ext>
+    </p:extLst>
+  </p:cSld>
+  <p:clrMapOvr>
+    <a:masterClrMapping/>
+  </p:clrMapOvr>
+</p:sld>
+</file>
+
+<file path=ppt/slides/slide31.xml><?xml version="1.0" encoding="utf-8"?>
+<p:sld xmlns:a="http://schemas.openxmlformats.org/drawingml/2006/main" xmlns:r="http://schemas.openxmlformats.org/officeDocument/2006/relationships" xmlns:p="http://schemas.openxmlformats.org/presentationml/2006/main">
+  <p:cSld>
+    <p:spTree>
+      <p:nvGrpSpPr>
+        <p:cNvPr id="1" name="">
+          <a:extLst>
+            <a:ext uri="{FF2B5EF4-FFF2-40B4-BE49-F238E27FC236}">
               <a16:creationId xmlns:a16="http://schemas.microsoft.com/office/drawing/2014/main" id="{05530C14-A451-B252-A163-2BDD6DC00B5E}"/>
             </a:ext>
           </a:extLst>
@@ -21132,7 +21457,7 @@
 </p:sld>
 </file>
 
-<file path=ppt/slides/slide31.xml><?xml version="1.0" encoding="utf-8"?>
+<file path=ppt/slides/slide32.xml><?xml version="1.0" encoding="utf-8"?>
 <p:sld xmlns:a="http://schemas.openxmlformats.org/drawingml/2006/main" xmlns:r="http://schemas.openxmlformats.org/officeDocument/2006/relationships" xmlns:p="http://schemas.openxmlformats.org/presentationml/2006/main">
   <p:cSld>
     <p:spTree>
@@ -21227,7 +21552,7 @@
 </p:sld>
 </file>
 
-<file path=ppt/slides/slide32.xml><?xml version="1.0" encoding="utf-8"?>
+<file path=ppt/slides/slide33.xml><?xml version="1.0" encoding="utf-8"?>
 <p:sld xmlns:a="http://schemas.openxmlformats.org/drawingml/2006/main" xmlns:r="http://schemas.openxmlformats.org/officeDocument/2006/relationships" xmlns:p="http://schemas.openxmlformats.org/presentationml/2006/main">
   <p:cSld>
     <p:spTree>
@@ -21327,7 +21652,7 @@
 </p:sld>
 </file>
 
-<file path=ppt/slides/slide33.xml><?xml version="1.0" encoding="utf-8"?>
+<file path=ppt/slides/slide34.xml><?xml version="1.0" encoding="utf-8"?>
 <p:sld xmlns:a="http://schemas.openxmlformats.org/drawingml/2006/main" xmlns:r="http://schemas.openxmlformats.org/officeDocument/2006/relationships" xmlns:p="http://schemas.openxmlformats.org/presentationml/2006/main">
   <p:cSld>
     <p:spTree>
@@ -21435,7 +21760,7 @@
 </p:sld>
 </file>
 
-<file path=ppt/slides/slide34.xml><?xml version="1.0" encoding="utf-8"?>
+<file path=ppt/slides/slide35.xml><?xml version="1.0" encoding="utf-8"?>
 <p:sld xmlns:a="http://schemas.openxmlformats.org/drawingml/2006/main" xmlns:r="http://schemas.openxmlformats.org/officeDocument/2006/relationships" xmlns:p="http://schemas.openxmlformats.org/presentationml/2006/main">
   <p:cSld>
     <p:spTree>
@@ -21543,7 +21868,7 @@
 </p:sld>
 </file>
 
-<file path=ppt/slides/slide35.xml><?xml version="1.0" encoding="utf-8"?>
+<file path=ppt/slides/slide36.xml><?xml version="1.0" encoding="utf-8"?>
 <p:sld xmlns:a="http://schemas.openxmlformats.org/drawingml/2006/main" xmlns:r="http://schemas.openxmlformats.org/officeDocument/2006/relationships" xmlns:p="http://schemas.openxmlformats.org/presentationml/2006/main">
   <p:cSld>
     <p:bg>
@@ -22703,7 +23028,7 @@
 </p:sld>
 </file>
 
-<file path=ppt/slides/slide36.xml><?xml version="1.0" encoding="utf-8"?>
+<file path=ppt/slides/slide37.xml><?xml version="1.0" encoding="utf-8"?>
 <p:sld xmlns:a="http://schemas.openxmlformats.org/drawingml/2006/main" xmlns:r="http://schemas.openxmlformats.org/officeDocument/2006/relationships" xmlns:p="http://schemas.openxmlformats.org/presentationml/2006/main">
   <p:cSld>
     <p:bg>
@@ -23843,7 +24168,7 @@
 </p:sld>
 </file>
 
-<file path=ppt/slides/slide37.xml><?xml version="1.0" encoding="utf-8"?>
+<file path=ppt/slides/slide38.xml><?xml version="1.0" encoding="utf-8"?>
 <p:sld xmlns:a="http://schemas.openxmlformats.org/drawingml/2006/main" xmlns:r="http://schemas.openxmlformats.org/officeDocument/2006/relationships" xmlns:p="http://schemas.openxmlformats.org/presentationml/2006/main">
   <p:cSld>
     <p:bg>
@@ -25240,94 +25565,6 @@
 </p:sld>
 </file>
 
-<file path=ppt/slides/slide38.xml><?xml version="1.0" encoding="utf-8"?>
-<p:sld xmlns:a="http://schemas.openxmlformats.org/drawingml/2006/main" xmlns:r="http://schemas.openxmlformats.org/officeDocument/2006/relationships" xmlns:p="http://schemas.openxmlformats.org/presentationml/2006/main">
-  <p:cSld>
-    <p:spTree>
-      <p:nvGrpSpPr>
-        <p:cNvPr id="1" name=""/>
-        <p:cNvGrpSpPr/>
-        <p:nvPr/>
-      </p:nvGrpSpPr>
-      <p:grpSpPr>
-        <a:xfrm>
-          <a:off x="0" y="0"/>
-          <a:ext cx="0" cy="0"/>
-          <a:chOff x="0" y="0"/>
-          <a:chExt cx="0" cy="0"/>
-        </a:xfrm>
-      </p:grpSpPr>
-      <p:sp>
-        <p:nvSpPr>
-          <p:cNvPr id="2" name="Title 1">
-            <a:extLst>
-              <a:ext uri="{FF2B5EF4-FFF2-40B4-BE49-F238E27FC236}">
-                <a16:creationId xmlns:a16="http://schemas.microsoft.com/office/drawing/2014/main" id="{AB6C0888-59A4-3A97-EF04-F5F640FEDB67}"/>
-              </a:ext>
-            </a:extLst>
-          </p:cNvPr>
-          <p:cNvSpPr>
-            <a:spLocks noGrp="1"/>
-          </p:cNvSpPr>
-          <p:nvPr>
-            <p:ph type="title"/>
-          </p:nvPr>
-        </p:nvSpPr>
-        <p:spPr/>
-        <p:txBody>
-          <a:bodyPr/>
-          <a:lstStyle/>
-          <a:p>
-            <a:r>
-              <a:rPr lang="en-US" dirty="0"/>
-              <a:t>Spring 7</a:t>
-            </a:r>
-          </a:p>
-        </p:txBody>
-      </p:sp>
-      <p:sp>
-        <p:nvSpPr>
-          <p:cNvPr id="3" name="Content Placeholder 2">
-            <a:extLst>
-              <a:ext uri="{FF2B5EF4-FFF2-40B4-BE49-F238E27FC236}">
-                <a16:creationId xmlns:a16="http://schemas.microsoft.com/office/drawing/2014/main" id="{A7822E91-0948-284A-5D51-F5FDC0330031}"/>
-              </a:ext>
-            </a:extLst>
-          </p:cNvPr>
-          <p:cNvSpPr>
-            <a:spLocks noGrp="1"/>
-          </p:cNvSpPr>
-          <p:nvPr>
-            <p:ph idx="1"/>
-          </p:nvPr>
-        </p:nvSpPr>
-        <p:spPr/>
-        <p:txBody>
-          <a:bodyPr>
-            <a:normAutofit/>
-          </a:bodyPr>
-          <a:lstStyle/>
-          <a:p>
-            <a:r>
-              <a:rPr lang="en-US" sz="2800" dirty="0"/>
-              <a:t>#TODO</a:t>
-            </a:r>
-          </a:p>
-        </p:txBody>
-      </p:sp>
-    </p:spTree>
-    <p:extLst>
-      <p:ext uri="{BB962C8B-B14F-4D97-AF65-F5344CB8AC3E}">
-        <p14:creationId xmlns:p14="http://schemas.microsoft.com/office/powerpoint/2010/main" val="2899600124"/>
-      </p:ext>
-    </p:extLst>
-  </p:cSld>
-  <p:clrMapOvr>
-    <a:masterClrMapping/>
-  </p:clrMapOvr>
-</p:sld>
-</file>
-
 <file path=ppt/slides/slide39.xml><?xml version="1.0" encoding="utf-8"?>
 <p:sld xmlns:a="http://schemas.openxmlformats.org/drawingml/2006/main" xmlns:r="http://schemas.openxmlformats.org/officeDocument/2006/relationships" xmlns:p="http://schemas.openxmlformats.org/presentationml/2006/main">
   <p:cSld>
@@ -25350,7 +25587,7 @@
           <p:cNvPr id="2" name="Title 1">
             <a:extLst>
               <a:ext uri="{FF2B5EF4-FFF2-40B4-BE49-F238E27FC236}">
-                <a16:creationId xmlns:a16="http://schemas.microsoft.com/office/drawing/2014/main" id="{7E1A6C48-3D5B-B8F0-C46C-33E81B4D6BDC}"/>
+                <a16:creationId xmlns:a16="http://schemas.microsoft.com/office/drawing/2014/main" id="{AB6C0888-59A4-3A97-EF04-F5F640FEDB67}"/>
               </a:ext>
             </a:extLst>
           </p:cNvPr>
@@ -25361,25 +25598,15 @@
             <p:ph type="title"/>
           </p:nvPr>
         </p:nvSpPr>
-        <p:spPr>
-          <a:xfrm>
-            <a:off x="646111" y="452718"/>
-            <a:ext cx="11120773" cy="1400530"/>
-          </a:xfrm>
-        </p:spPr>
+        <p:spPr/>
         <p:txBody>
           <a:bodyPr/>
           <a:lstStyle/>
           <a:p>
             <a:r>
               <a:rPr lang="en-US" dirty="0"/>
-              <a:t>References - </a:t>
-            </a:r>
-            <a:r>
-              <a:rPr lang="en-US" sz="4400" dirty="0"/>
-              <a:t>Maven 4</a:t>
-            </a:r>
-            <a:endParaRPr lang="en-US" dirty="0"/>
+              <a:t>Spring 7</a:t>
+            </a:r>
           </a:p>
         </p:txBody>
       </p:sp>
@@ -25388,7 +25615,7 @@
           <p:cNvPr id="3" name="Content Placeholder 2">
             <a:extLst>
               <a:ext uri="{FF2B5EF4-FFF2-40B4-BE49-F238E27FC236}">
-                <a16:creationId xmlns:a16="http://schemas.microsoft.com/office/drawing/2014/main" id="{5DD7A1DA-6E97-7686-69B6-CCCF1EBAB961}"/>
+                <a16:creationId xmlns:a16="http://schemas.microsoft.com/office/drawing/2014/main" id="{A7822E91-0948-284A-5D51-F5FDC0330031}"/>
               </a:ext>
             </a:extLst>
           </p:cNvPr>
@@ -25399,120 +25626,24 @@
             <p:ph idx="1"/>
           </p:nvPr>
         </p:nvSpPr>
-        <p:spPr>
-          <a:xfrm>
-            <a:off x="646111" y="1468192"/>
-            <a:ext cx="11120773" cy="4780207"/>
-          </a:xfrm>
-        </p:spPr>
+        <p:spPr/>
         <p:txBody>
           <a:bodyPr>
-            <a:normAutofit fontScale="92500" lnSpcReduction="10000"/>
+            <a:normAutofit/>
           </a:bodyPr>
           <a:lstStyle/>
           <a:p>
             <a:r>
-              <a:rPr lang="en-US" sz="2800" dirty="0">
-                <a:hlinkClick r:id="rId2"/>
-              </a:rPr>
-              <a:t>https://maven.apache.org/whatsnewinmaven4.html</a:t>
-            </a:r>
-            <a:endParaRPr lang="en-US" sz="2800" dirty="0"/>
-          </a:p>
-          <a:p>
-            <a:r>
-              <a:rPr lang="en-US" sz="2800" dirty="0">
-                <a:hlinkClick r:id="rId3"/>
-              </a:rPr>
-              <a:t>https://maarten.mulders.it/2021/03/introduction-to-maven-toolchains</a:t>
-            </a:r>
-            <a:endParaRPr lang="en-US" sz="2800" dirty="0"/>
-          </a:p>
-          <a:p>
-            <a:r>
-              <a:rPr lang="en-GB" sz="2800" dirty="0">
-                <a:hlinkClick r:id="rId4"/>
-              </a:rPr>
-              <a:t>https://ant.apache.org</a:t>
-            </a:r>
-            <a:r>
-              <a:rPr lang="en-GB" sz="2800" dirty="0"/>
-              <a:t> </a:t>
-            </a:r>
-          </a:p>
-          <a:p>
-            <a:r>
-              <a:rPr lang="en-GB" sz="2800" dirty="0">
-                <a:hlinkClick r:id="rId5"/>
-              </a:rPr>
-              <a:t>https://gradle.org</a:t>
-            </a:r>
-            <a:r>
-              <a:rPr lang="en-GB" sz="2800" dirty="0"/>
-              <a:t> </a:t>
-            </a:r>
-          </a:p>
-          <a:p>
-            <a:r>
-              <a:rPr lang="en-GB" sz="2800" dirty="0"/>
-              <a:t> </a:t>
-            </a:r>
-            <a:r>
-              <a:rPr lang="en-GB" sz="2800" dirty="0">
-                <a:hlinkClick r:id="rId6"/>
-              </a:rPr>
-              <a:t>https://github.com/bazelbuild</a:t>
-            </a:r>
-            <a:r>
-              <a:rPr lang="en-GB" sz="2800" dirty="0"/>
-              <a:t> </a:t>
-            </a:r>
-          </a:p>
-          <a:p>
-            <a:r>
-              <a:rPr lang="en-GB" sz="2800" dirty="0">
-                <a:hlinkClick r:id="rId7"/>
-              </a:rPr>
-              <a:t>https://cstamas.org/blog/2024/09/handling-sensitive-data-in-maven</a:t>
-            </a:r>
-            <a:r>
-              <a:rPr lang="en-GB" sz="2800" dirty="0"/>
-              <a:t> </a:t>
-            </a:r>
-          </a:p>
-          <a:p>
-            <a:r>
-              <a:rPr lang="en-GB" sz="2800" dirty="0">
-                <a:hlinkClick r:id="rId8"/>
-              </a:rPr>
-              <a:t>https://github.com/apache/maven-mvnd</a:t>
-            </a:r>
-            <a:r>
-              <a:rPr lang="en-GB" sz="2800" dirty="0"/>
-              <a:t> </a:t>
-            </a:r>
-          </a:p>
-          <a:p>
-            <a:r>
-              <a:rPr lang="en-GB" sz="2800" dirty="0">
-                <a:hlinkClick r:id="rId9"/>
-              </a:rPr>
-              <a:t>https://maven.apache.org/tools/mvnsh.html</a:t>
-            </a:r>
-            <a:r>
-              <a:rPr lang="en-GB" sz="2800" dirty="0"/>
-              <a:t> </a:t>
-            </a:r>
-          </a:p>
-          <a:p>
-            <a:endParaRPr lang="en-US" sz="2800" dirty="0"/>
+              <a:rPr lang="en-US" sz="2800" dirty="0"/>
+              <a:t>#TODO</a:t>
+            </a:r>
           </a:p>
         </p:txBody>
       </p:sp>
     </p:spTree>
     <p:extLst>
       <p:ext uri="{BB962C8B-B14F-4D97-AF65-F5344CB8AC3E}">
-        <p14:creationId xmlns:p14="http://schemas.microsoft.com/office/powerpoint/2010/main" val="2302544402"/>
+        <p14:creationId xmlns:p14="http://schemas.microsoft.com/office/powerpoint/2010/main" val="2899600124"/>
       </p:ext>
     </p:extLst>
   </p:cSld>
@@ -25707,6 +25838,200 @@
   <p:cSld>
     <p:spTree>
       <p:nvGrpSpPr>
+        <p:cNvPr id="1" name=""/>
+        <p:cNvGrpSpPr/>
+        <p:nvPr/>
+      </p:nvGrpSpPr>
+      <p:grpSpPr>
+        <a:xfrm>
+          <a:off x="0" y="0"/>
+          <a:ext cx="0" cy="0"/>
+          <a:chOff x="0" y="0"/>
+          <a:chExt cx="0" cy="0"/>
+        </a:xfrm>
+      </p:grpSpPr>
+      <p:sp>
+        <p:nvSpPr>
+          <p:cNvPr id="2" name="Title 1">
+            <a:extLst>
+              <a:ext uri="{FF2B5EF4-FFF2-40B4-BE49-F238E27FC236}">
+                <a16:creationId xmlns:a16="http://schemas.microsoft.com/office/drawing/2014/main" id="{7E1A6C48-3D5B-B8F0-C46C-33E81B4D6BDC}"/>
+              </a:ext>
+            </a:extLst>
+          </p:cNvPr>
+          <p:cNvSpPr>
+            <a:spLocks noGrp="1"/>
+          </p:cNvSpPr>
+          <p:nvPr>
+            <p:ph type="title"/>
+          </p:nvPr>
+        </p:nvSpPr>
+        <p:spPr>
+          <a:xfrm>
+            <a:off x="646111" y="452718"/>
+            <a:ext cx="11120773" cy="1400530"/>
+          </a:xfrm>
+        </p:spPr>
+        <p:txBody>
+          <a:bodyPr/>
+          <a:lstStyle/>
+          <a:p>
+            <a:r>
+              <a:rPr lang="en-US" dirty="0"/>
+              <a:t>References - </a:t>
+            </a:r>
+            <a:r>
+              <a:rPr lang="en-US" sz="4400" dirty="0"/>
+              <a:t>Maven 4</a:t>
+            </a:r>
+            <a:endParaRPr lang="en-US" dirty="0"/>
+          </a:p>
+        </p:txBody>
+      </p:sp>
+      <p:sp>
+        <p:nvSpPr>
+          <p:cNvPr id="3" name="Content Placeholder 2">
+            <a:extLst>
+              <a:ext uri="{FF2B5EF4-FFF2-40B4-BE49-F238E27FC236}">
+                <a16:creationId xmlns:a16="http://schemas.microsoft.com/office/drawing/2014/main" id="{5DD7A1DA-6E97-7686-69B6-CCCF1EBAB961}"/>
+              </a:ext>
+            </a:extLst>
+          </p:cNvPr>
+          <p:cNvSpPr>
+            <a:spLocks noGrp="1"/>
+          </p:cNvSpPr>
+          <p:nvPr>
+            <p:ph idx="1"/>
+          </p:nvPr>
+        </p:nvSpPr>
+        <p:spPr>
+          <a:xfrm>
+            <a:off x="646111" y="1468192"/>
+            <a:ext cx="11120773" cy="4780207"/>
+          </a:xfrm>
+        </p:spPr>
+        <p:txBody>
+          <a:bodyPr>
+            <a:normAutofit fontScale="92500" lnSpcReduction="10000"/>
+          </a:bodyPr>
+          <a:lstStyle/>
+          <a:p>
+            <a:r>
+              <a:rPr lang="en-US" sz="2800" dirty="0">
+                <a:hlinkClick r:id="rId2"/>
+              </a:rPr>
+              <a:t>https://maven.apache.org/whatsnewinmaven4.html</a:t>
+            </a:r>
+            <a:endParaRPr lang="en-US" sz="2800" dirty="0"/>
+          </a:p>
+          <a:p>
+            <a:r>
+              <a:rPr lang="en-US" sz="2800" dirty="0">
+                <a:hlinkClick r:id="rId3"/>
+              </a:rPr>
+              <a:t>https://maarten.mulders.it/2021/03/introduction-to-maven-toolchains</a:t>
+            </a:r>
+            <a:endParaRPr lang="en-US" sz="2800" dirty="0"/>
+          </a:p>
+          <a:p>
+            <a:r>
+              <a:rPr lang="en-GB" sz="2800" dirty="0">
+                <a:hlinkClick r:id="rId4"/>
+              </a:rPr>
+              <a:t>https://ant.apache.org</a:t>
+            </a:r>
+            <a:r>
+              <a:rPr lang="en-GB" sz="2800" dirty="0"/>
+              <a:t> </a:t>
+            </a:r>
+          </a:p>
+          <a:p>
+            <a:r>
+              <a:rPr lang="en-GB" sz="2800" dirty="0">
+                <a:hlinkClick r:id="rId5"/>
+              </a:rPr>
+              <a:t>https://gradle.org</a:t>
+            </a:r>
+            <a:r>
+              <a:rPr lang="en-GB" sz="2800" dirty="0"/>
+              <a:t> </a:t>
+            </a:r>
+          </a:p>
+          <a:p>
+            <a:r>
+              <a:rPr lang="en-GB" sz="2800" dirty="0"/>
+              <a:t> </a:t>
+            </a:r>
+            <a:r>
+              <a:rPr lang="en-GB" sz="2800" dirty="0">
+                <a:hlinkClick r:id="rId6"/>
+              </a:rPr>
+              <a:t>https://github.com/bazelbuild</a:t>
+            </a:r>
+            <a:r>
+              <a:rPr lang="en-GB" sz="2800" dirty="0"/>
+              <a:t> </a:t>
+            </a:r>
+          </a:p>
+          <a:p>
+            <a:r>
+              <a:rPr lang="en-GB" sz="2800" dirty="0">
+                <a:hlinkClick r:id="rId7"/>
+              </a:rPr>
+              <a:t>https://cstamas.org/blog/2024/09/handling-sensitive-data-in-maven</a:t>
+            </a:r>
+            <a:r>
+              <a:rPr lang="en-GB" sz="2800" dirty="0"/>
+              <a:t> </a:t>
+            </a:r>
+          </a:p>
+          <a:p>
+            <a:r>
+              <a:rPr lang="en-GB" sz="2800" dirty="0">
+                <a:hlinkClick r:id="rId8"/>
+              </a:rPr>
+              <a:t>https://github.com/apache/maven-mvnd</a:t>
+            </a:r>
+            <a:r>
+              <a:rPr lang="en-GB" sz="2800" dirty="0"/>
+              <a:t> </a:t>
+            </a:r>
+          </a:p>
+          <a:p>
+            <a:r>
+              <a:rPr lang="en-GB" sz="2800" dirty="0">
+                <a:hlinkClick r:id="rId9"/>
+              </a:rPr>
+              <a:t>https://maven.apache.org/tools/mvnsh.html</a:t>
+            </a:r>
+            <a:r>
+              <a:rPr lang="en-GB" sz="2800" dirty="0"/>
+              <a:t> </a:t>
+            </a:r>
+          </a:p>
+          <a:p>
+            <a:endParaRPr lang="en-US" sz="2800" dirty="0"/>
+          </a:p>
+        </p:txBody>
+      </p:sp>
+    </p:spTree>
+    <p:extLst>
+      <p:ext uri="{BB962C8B-B14F-4D97-AF65-F5344CB8AC3E}">
+        <p14:creationId xmlns:p14="http://schemas.microsoft.com/office/powerpoint/2010/main" val="2302544402"/>
+      </p:ext>
+    </p:extLst>
+  </p:cSld>
+  <p:clrMapOvr>
+    <a:masterClrMapping/>
+  </p:clrMapOvr>
+</p:sld>
+</file>
+
+<file path=ppt/slides/slide41.xml><?xml version="1.0" encoding="utf-8"?>
+<p:sld xmlns:a="http://schemas.openxmlformats.org/drawingml/2006/main" xmlns:r="http://schemas.openxmlformats.org/officeDocument/2006/relationships" xmlns:p="http://schemas.openxmlformats.org/presentationml/2006/main">
+  <p:cSld>
+    <p:spTree>
+      <p:nvGrpSpPr>
         <p:cNvPr id="1" name="">
           <a:extLst>
             <a:ext uri="{FF2B5EF4-FFF2-40B4-BE49-F238E27FC236}">
@@ -25811,7 +26136,7 @@
 </p:sld>
 </file>
 
-<file path=ppt/slides/slide41.xml><?xml version="1.0" encoding="utf-8"?>
+<file path=ppt/slides/slide42.xml><?xml version="1.0" encoding="utf-8"?>
 <p:sld xmlns:a="http://schemas.openxmlformats.org/drawingml/2006/main" xmlns:r="http://schemas.openxmlformats.org/officeDocument/2006/relationships" xmlns:p="http://schemas.openxmlformats.org/presentationml/2006/main">
   <p:cSld>
     <p:spTree>

</xml_diff>

<commit_message>
005 added examples for Vts and scoped values
</commit_message>
<xml_diff>
--- a/maven4-java25-presentation.pptx
+++ b/maven4-java25-presentation.pptx
@@ -5,7 +5,7 @@
     <p:sldMasterId id="2147483648" r:id="rId1"/>
   </p:sldMasterIdLst>
   <p:notesMasterIdLst>
-    <p:notesMasterId r:id="rId44"/>
+    <p:notesMasterId r:id="rId45"/>
   </p:notesMasterIdLst>
   <p:sldIdLst>
     <p:sldId id="256" r:id="rId2"/>
@@ -37,19 +37,20 @@
     <p:sldId id="275" r:id="rId28"/>
     <p:sldId id="289" r:id="rId29"/>
     <p:sldId id="294" r:id="rId30"/>
-    <p:sldId id="290" r:id="rId31"/>
-    <p:sldId id="291" r:id="rId32"/>
-    <p:sldId id="292" r:id="rId33"/>
-    <p:sldId id="293" r:id="rId34"/>
-    <p:sldId id="295" r:id="rId35"/>
-    <p:sldId id="296" r:id="rId36"/>
-    <p:sldId id="297" r:id="rId37"/>
-    <p:sldId id="298" r:id="rId38"/>
-    <p:sldId id="270" r:id="rId39"/>
-    <p:sldId id="276" r:id="rId40"/>
-    <p:sldId id="271" r:id="rId41"/>
-    <p:sldId id="273" r:id="rId42"/>
-    <p:sldId id="274" r:id="rId43"/>
+    <p:sldId id="300" r:id="rId31"/>
+    <p:sldId id="296" r:id="rId32"/>
+    <p:sldId id="290" r:id="rId33"/>
+    <p:sldId id="291" r:id="rId34"/>
+    <p:sldId id="292" r:id="rId35"/>
+    <p:sldId id="293" r:id="rId36"/>
+    <p:sldId id="295" r:id="rId37"/>
+    <p:sldId id="297" r:id="rId38"/>
+    <p:sldId id="298" r:id="rId39"/>
+    <p:sldId id="270" r:id="rId40"/>
+    <p:sldId id="276" r:id="rId41"/>
+    <p:sldId id="271" r:id="rId42"/>
+    <p:sldId id="273" r:id="rId43"/>
+    <p:sldId id="274" r:id="rId44"/>
   </p:sldIdLst>
   <p:sldSz cx="12192000" cy="6858000"/>
   <p:notesSz cx="6858000" cy="9144000"/>
@@ -3929,7 +3930,7 @@
           <a:p>
             <a:fld id="{0311717A-8604-9C49-9115-9B2537028286}" type="datetimeFigureOut">
               <a:rPr lang="en-US" smtClean="0"/>
-              <a:t>11/26/25</a:t>
+              <a:t>1/6/26</a:t>
             </a:fld>
             <a:endParaRPr lang="en-US"/>
           </a:p>
@@ -5842,6 +5843,102 @@
 </p:notes>
 </file>
 
+<file path=ppt/notesSlides/notesSlide21.xml><?xml version="1.0" encoding="utf-8"?>
+<p:notes xmlns:a="http://schemas.openxmlformats.org/drawingml/2006/main" xmlns:r="http://schemas.openxmlformats.org/officeDocument/2006/relationships" xmlns:p="http://schemas.openxmlformats.org/presentationml/2006/main">
+  <p:cSld>
+    <p:spTree>
+      <p:nvGrpSpPr>
+        <p:cNvPr id="1" name=""/>
+        <p:cNvGrpSpPr/>
+        <p:nvPr/>
+      </p:nvGrpSpPr>
+      <p:grpSpPr>
+        <a:xfrm>
+          <a:off x="0" y="0"/>
+          <a:ext cx="0" cy="0"/>
+          <a:chOff x="0" y="0"/>
+          <a:chExt cx="0" cy="0"/>
+        </a:xfrm>
+      </p:grpSpPr>
+      <p:sp>
+        <p:nvSpPr>
+          <p:cNvPr id="2" name="Slide Image Placeholder 1"/>
+          <p:cNvSpPr>
+            <a:spLocks noGrp="1" noRot="1" noChangeAspect="1"/>
+          </p:cNvSpPr>
+          <p:nvPr>
+            <p:ph type="sldImg"/>
+          </p:nvPr>
+        </p:nvSpPr>
+        <p:spPr/>
+      </p:sp>
+      <p:sp>
+        <p:nvSpPr>
+          <p:cNvPr id="3" name="Notes Placeholder 2"/>
+          <p:cNvSpPr>
+            <a:spLocks noGrp="1"/>
+          </p:cNvSpPr>
+          <p:nvPr>
+            <p:ph type="body" idx="1"/>
+          </p:nvPr>
+        </p:nvSpPr>
+        <p:spPr/>
+        <p:txBody>
+          <a:bodyPr/>
+          <a:lstStyle/>
+          <a:p>
+            <a:r>
+              <a:rPr lang="en-US" dirty="0"/>
+              <a:t>… </a:t>
+            </a:r>
+            <a:r>
+              <a:rPr lang="en-US" sz="1200" dirty="0"/>
+              <a:t>modules, </a:t>
+            </a:r>
+            <a:r>
+              <a:rPr lang="en-US" sz="1200"/>
+              <a:t>of course</a:t>
+            </a:r>
+            <a:endParaRPr lang="en-US"/>
+          </a:p>
+        </p:txBody>
+      </p:sp>
+      <p:sp>
+        <p:nvSpPr>
+          <p:cNvPr id="4" name="Slide Number Placeholder 3"/>
+          <p:cNvSpPr>
+            <a:spLocks noGrp="1"/>
+          </p:cNvSpPr>
+          <p:nvPr>
+            <p:ph type="sldNum" sz="quarter" idx="5"/>
+          </p:nvPr>
+        </p:nvSpPr>
+        <p:spPr/>
+        <p:txBody>
+          <a:bodyPr/>
+          <a:lstStyle/>
+          <a:p>
+            <a:fld id="{0B1A8FFB-CB5A-5744-992F-509A4FA86679}" type="slidenum">
+              <a:rPr lang="en-US" smtClean="0"/>
+              <a:t>32</a:t>
+            </a:fld>
+            <a:endParaRPr lang="en-US"/>
+          </a:p>
+        </p:txBody>
+      </p:sp>
+    </p:spTree>
+    <p:extLst>
+      <p:ext uri="{BB962C8B-B14F-4D97-AF65-F5344CB8AC3E}">
+        <p14:creationId xmlns:p14="http://schemas.microsoft.com/office/powerpoint/2010/main" val="2791568656"/>
+      </p:ext>
+    </p:extLst>
+  </p:cSld>
+  <p:clrMapOvr>
+    <a:masterClrMapping/>
+  </p:clrMapOvr>
+</p:notes>
+</file>
+
 <file path=ppt/notesSlides/notesSlide3.xml><?xml version="1.0" encoding="utf-8"?>
 <p:notes xmlns:a="http://schemas.openxmlformats.org/drawingml/2006/main" xmlns:r="http://schemas.openxmlformats.org/officeDocument/2006/relationships" xmlns:p="http://schemas.openxmlformats.org/presentationml/2006/main">
   <p:cSld>
@@ -6798,7 +6895,7 @@
           <a:p>
             <a:fld id="{4AAD347D-5ACD-4C99-B74B-A9C85AD731AF}" type="datetimeFigureOut">
               <a:rPr lang="en-US" dirty="0"/>
-              <a:t>11/26/25</a:t>
+              <a:t>1/6/26</a:t>
             </a:fld>
             <a:endParaRPr lang="en-US" dirty="0"/>
           </a:p>
@@ -7068,7 +7165,7 @@
           <a:p>
             <a:fld id="{4509A250-FF31-4206-8172-F9D3106AACB1}" type="datetimeFigureOut">
               <a:rPr lang="en-US" dirty="0"/>
-              <a:t>11/26/25</a:t>
+              <a:t>1/6/26</a:t>
             </a:fld>
             <a:endParaRPr lang="en-US" dirty="0"/>
           </a:p>
@@ -7257,7 +7354,7 @@
           <a:p>
             <a:fld id="{4509A250-FF31-4206-8172-F9D3106AACB1}" type="datetimeFigureOut">
               <a:rPr lang="en-US" dirty="0"/>
-              <a:t>11/26/25</a:t>
+              <a:t>1/6/26</a:t>
             </a:fld>
             <a:endParaRPr lang="en-US" dirty="0"/>
           </a:p>
@@ -7525,7 +7622,7 @@
           <a:p>
             <a:fld id="{4509A250-FF31-4206-8172-F9D3106AACB1}" type="datetimeFigureOut">
               <a:rPr lang="en-US" dirty="0"/>
-              <a:t>11/26/25</a:t>
+              <a:t>1/6/26</a:t>
             </a:fld>
             <a:endParaRPr lang="en-US" dirty="0"/>
           </a:p>
@@ -7861,7 +7958,7 @@
           <a:p>
             <a:fld id="{4509A250-FF31-4206-8172-F9D3106AACB1}" type="datetimeFigureOut">
               <a:rPr lang="en-US" dirty="0"/>
-              <a:t>11/26/25</a:t>
+              <a:t>1/6/26</a:t>
             </a:fld>
             <a:endParaRPr lang="en-US" dirty="0"/>
           </a:p>
@@ -8479,7 +8576,7 @@
           <a:p>
             <a:fld id="{4509A250-FF31-4206-8172-F9D3106AACB1}" type="datetimeFigureOut">
               <a:rPr lang="en-US" dirty="0"/>
-              <a:t>11/26/25</a:t>
+              <a:t>1/6/26</a:t>
             </a:fld>
             <a:endParaRPr lang="en-US" dirty="0"/>
           </a:p>
@@ -9334,7 +9431,7 @@
           <a:p>
             <a:fld id="{4509A250-FF31-4206-8172-F9D3106AACB1}" type="datetimeFigureOut">
               <a:rPr lang="en-US" dirty="0"/>
-              <a:t>11/26/25</a:t>
+              <a:t>1/6/26</a:t>
             </a:fld>
             <a:endParaRPr lang="en-US" dirty="0"/>
           </a:p>
@@ -9499,7 +9596,7 @@
           <a:p>
             <a:fld id="{4509A250-FF31-4206-8172-F9D3106AACB1}" type="datetimeFigureOut">
               <a:rPr lang="en-US" dirty="0"/>
-              <a:t>11/26/25</a:t>
+              <a:t>1/6/26</a:t>
             </a:fld>
             <a:endParaRPr lang="en-US" dirty="0"/>
           </a:p>
@@ -9674,7 +9771,7 @@
           <a:p>
             <a:fld id="{4509A250-FF31-4206-8172-F9D3106AACB1}" type="datetimeFigureOut">
               <a:rPr lang="en-US" dirty="0"/>
-              <a:t>11/26/25</a:t>
+              <a:t>1/6/26</a:t>
             </a:fld>
             <a:endParaRPr lang="en-US" dirty="0"/>
           </a:p>
@@ -9839,7 +9936,7 @@
           <a:p>
             <a:fld id="{4509A250-FF31-4206-8172-F9D3106AACB1}" type="datetimeFigureOut">
               <a:rPr lang="en-US" dirty="0"/>
-              <a:t>11/26/25</a:t>
+              <a:t>1/6/26</a:t>
             </a:fld>
             <a:endParaRPr lang="en-US" dirty="0"/>
           </a:p>
@@ -10081,7 +10178,7 @@
           <a:p>
             <a:fld id="{9796027F-7875-4030-9381-8BD8C4F21935}" type="datetimeFigureOut">
               <a:rPr lang="en-US" dirty="0"/>
-              <a:t>11/26/25</a:t>
+              <a:t>1/6/26</a:t>
             </a:fld>
             <a:endParaRPr lang="en-US" dirty="0"/>
           </a:p>
@@ -10368,7 +10465,7 @@
           <a:p>
             <a:fld id="{9796027F-7875-4030-9381-8BD8C4F21935}" type="datetimeFigureOut">
               <a:rPr lang="en-US" dirty="0"/>
-              <a:t>11/26/25</a:t>
+              <a:t>1/6/26</a:t>
             </a:fld>
             <a:endParaRPr lang="en-US" dirty="0"/>
           </a:p>
@@ -10807,7 +10904,7 @@
           <a:p>
             <a:fld id="{9796027F-7875-4030-9381-8BD8C4F21935}" type="datetimeFigureOut">
               <a:rPr lang="en-US" dirty="0"/>
-              <a:t>11/26/25</a:t>
+              <a:t>1/6/26</a:t>
             </a:fld>
             <a:endParaRPr lang="en-US" dirty="0"/>
           </a:p>
@@ -10920,7 +11017,7 @@
           <a:p>
             <a:fld id="{4509A250-FF31-4206-8172-F9D3106AACB1}" type="datetimeFigureOut">
               <a:rPr lang="en-US" dirty="0"/>
-              <a:t>11/26/25</a:t>
+              <a:t>1/6/26</a:t>
             </a:fld>
             <a:endParaRPr lang="en-US" dirty="0"/>
           </a:p>
@@ -11010,7 +11107,7 @@
           <a:p>
             <a:fld id="{4509A250-FF31-4206-8172-F9D3106AACB1}" type="datetimeFigureOut">
               <a:rPr lang="en-US" dirty="0"/>
-              <a:t>11/26/25</a:t>
+              <a:t>1/6/26</a:t>
             </a:fld>
             <a:endParaRPr lang="en-US" dirty="0"/>
           </a:p>
@@ -11284,7 +11381,7 @@
           <a:p>
             <a:fld id="{4509A250-FF31-4206-8172-F9D3106AACB1}" type="datetimeFigureOut">
               <a:rPr lang="en-US" dirty="0"/>
-              <a:t>11/26/25</a:t>
+              <a:t>1/6/26</a:t>
             </a:fld>
             <a:endParaRPr lang="en-US" dirty="0"/>
           </a:p>
@@ -11554,7 +11651,7 @@
           <a:p>
             <a:fld id="{4509A250-FF31-4206-8172-F9D3106AACB1}" type="datetimeFigureOut">
               <a:rPr lang="en-US" dirty="0"/>
-              <a:t>11/26/25</a:t>
+              <a:t>1/6/26</a:t>
             </a:fld>
             <a:endParaRPr lang="en-US" dirty="0"/>
           </a:p>
@@ -11992,7 +12089,7 @@
           <a:p>
             <a:fld id="{4AAD347D-5ACD-4C99-B74B-A9C85AD731AF}" type="datetimeFigureOut">
               <a:rPr lang="en-US" dirty="0"/>
-              <a:t>11/26/25</a:t>
+              <a:t>1/6/26</a:t>
             </a:fld>
             <a:endParaRPr lang="en-US" dirty="0"/>
           </a:p>
@@ -19644,6 +19741,21 @@
             <a:pPr lvl="1"/>
             <a:r>
               <a:rPr lang="en-US" sz="2000" dirty="0"/>
+              <a:t>JEP505: Structured Concurrency (5</a:t>
+            </a:r>
+            <a:r>
+              <a:rPr lang="en-US" sz="2000" baseline="30000" dirty="0"/>
+              <a:t>th</a:t>
+            </a:r>
+            <a:r>
+              <a:rPr lang="en-US" sz="2000" dirty="0"/>
+              <a:t> Preview)</a:t>
+            </a:r>
+          </a:p>
+          <a:p>
+            <a:pPr lvl="1"/>
+            <a:r>
+              <a:rPr lang="en-US" sz="2000" dirty="0"/>
               <a:t>JEP511: Module Import Declarations</a:t>
             </a:r>
           </a:p>
@@ -19685,21 +19797,6 @@
             <a:r>
               <a:rPr lang="en-US" sz="2000" baseline="30000" dirty="0"/>
               <a:t>rd</a:t>
-            </a:r>
-            <a:r>
-              <a:rPr lang="en-US" sz="2000" dirty="0"/>
-              <a:t> Preview)</a:t>
-            </a:r>
-          </a:p>
-          <a:p>
-            <a:pPr lvl="1"/>
-            <a:r>
-              <a:rPr lang="en-US" sz="2000" dirty="0"/>
-              <a:t>JEP505: Structured Concurrency (5</a:t>
-            </a:r>
-            <a:r>
-              <a:rPr lang="en-US" sz="2000" baseline="30000" dirty="0"/>
-              <a:t>th</a:t>
             </a:r>
             <a:r>
               <a:rPr lang="en-US" sz="2000" dirty="0"/>
@@ -19798,7 +19895,7 @@
           <a:p>
             <a:r>
               <a:rPr lang="en-US" dirty="0"/>
-              <a:t>Scoped Values</a:t>
+              <a:t>JEP-506: Scoped Values</a:t>
             </a:r>
           </a:p>
         </p:txBody>
@@ -19819,7 +19916,12 @@
             <p:ph idx="1"/>
           </p:nvPr>
         </p:nvSpPr>
-        <p:spPr/>
+        <p:spPr>
+          <a:xfrm>
+            <a:off x="1103312" y="1554480"/>
+            <a:ext cx="8946541" cy="4693919"/>
+          </a:xfrm>
+        </p:spPr>
         <p:txBody>
           <a:bodyPr>
             <a:normAutofit/>
@@ -19829,8 +19931,36 @@
             <a:pPr lvl="1"/>
             <a:r>
               <a:rPr lang="en-US" sz="2600" dirty="0"/>
-              <a:t># TODO</a:t>
-            </a:r>
+              <a:t>To explain the introduction of Scoped values I need to explain 3 things:</a:t>
+            </a:r>
+          </a:p>
+          <a:p>
+            <a:pPr lvl="2"/>
+            <a:r>
+              <a:rPr lang="en-US" sz="2400" dirty="0"/>
+              <a:t>Platform Threads</a:t>
+            </a:r>
+          </a:p>
+          <a:p>
+            <a:pPr lvl="2"/>
+            <a:r>
+              <a:rPr lang="en-US" sz="2400" dirty="0"/>
+              <a:t>Virtual Threads (and Structured Concurrency)</a:t>
+            </a:r>
+          </a:p>
+          <a:p>
+            <a:pPr lvl="2"/>
+            <a:r>
+              <a:rPr lang="en-US" sz="2400" dirty="0" err="1">
+                <a:latin typeface="Consolas" panose="020B0609020204030204" pitchFamily="49" charset="0"/>
+                <a:cs typeface="Consolas" panose="020B0609020204030204" pitchFamily="49" charset="0"/>
+              </a:rPr>
+              <a:t>ThreadLocal</a:t>
+            </a:r>
+            <a:endParaRPr lang="en-US" sz="2200" dirty="0">
+              <a:latin typeface="Consolas" panose="020B0609020204030204" pitchFamily="49" charset="0"/>
+              <a:cs typeface="Consolas" panose="020B0609020204030204" pitchFamily="49" charset="0"/>
+            </a:endParaRPr>
           </a:p>
         </p:txBody>
       </p:sp>
@@ -21265,6 +21395,243 @@
         <p:cNvPr id="1" name="">
           <a:extLst>
             <a:ext uri="{FF2B5EF4-FFF2-40B4-BE49-F238E27FC236}">
+              <a16:creationId xmlns:a16="http://schemas.microsoft.com/office/drawing/2014/main" id="{97C106C2-2485-40BD-F117-1E433DA47EAF}"/>
+            </a:ext>
+          </a:extLst>
+        </p:cNvPr>
+        <p:cNvGrpSpPr/>
+        <p:nvPr/>
+      </p:nvGrpSpPr>
+      <p:grpSpPr>
+        <a:xfrm>
+          <a:off x="0" y="0"/>
+          <a:ext cx="0" cy="0"/>
+          <a:chOff x="0" y="0"/>
+          <a:chExt cx="0" cy="0"/>
+        </a:xfrm>
+      </p:grpSpPr>
+      <p:pic>
+        <p:nvPicPr>
+          <p:cNvPr id="5" name="Content Placeholder 4" descr="A screenshot of a diagram&#10;&#10;AI-generated content may be incorrect.">
+            <a:extLst>
+              <a:ext uri="{FF2B5EF4-FFF2-40B4-BE49-F238E27FC236}">
+                <a16:creationId xmlns:a16="http://schemas.microsoft.com/office/drawing/2014/main" id="{BBAF1362-7F34-FD8E-ED14-39C058F34195}"/>
+              </a:ext>
+            </a:extLst>
+          </p:cNvPr>
+          <p:cNvPicPr>
+            <a:picLocks noGrp="1" noChangeAspect="1"/>
+          </p:cNvPicPr>
+          <p:nvPr>
+            <p:ph idx="1"/>
+          </p:nvPr>
+        </p:nvPicPr>
+        <p:blipFill>
+          <a:blip r:embed="rId2"/>
+          <a:stretch>
+            <a:fillRect/>
+          </a:stretch>
+        </p:blipFill>
+        <p:spPr>
+          <a:xfrm>
+            <a:off x="366024" y="242371"/>
+            <a:ext cx="8623739" cy="6467805"/>
+          </a:xfrm>
+        </p:spPr>
+      </p:pic>
+    </p:spTree>
+    <p:extLst>
+      <p:ext uri="{BB962C8B-B14F-4D97-AF65-F5344CB8AC3E}">
+        <p14:creationId xmlns:p14="http://schemas.microsoft.com/office/powerpoint/2010/main" val="4259450738"/>
+      </p:ext>
+    </p:extLst>
+  </p:cSld>
+  <p:clrMapOvr>
+    <a:masterClrMapping/>
+  </p:clrMapOvr>
+</p:sld>
+</file>
+
+<file path=ppt/slides/slide31.xml><?xml version="1.0" encoding="utf-8"?>
+<p:sld xmlns:a="http://schemas.openxmlformats.org/drawingml/2006/main" xmlns:r="http://schemas.openxmlformats.org/officeDocument/2006/relationships" xmlns:p="http://schemas.openxmlformats.org/presentationml/2006/main">
+  <p:cSld>
+    <p:spTree>
+      <p:nvGrpSpPr>
+        <p:cNvPr id="1" name="">
+          <a:extLst>
+            <a:ext uri="{FF2B5EF4-FFF2-40B4-BE49-F238E27FC236}">
+              <a16:creationId xmlns:a16="http://schemas.microsoft.com/office/drawing/2014/main" id="{740E3B0D-47CD-1B36-D29F-6A90009A5C89}"/>
+            </a:ext>
+          </a:extLst>
+        </p:cNvPr>
+        <p:cNvGrpSpPr/>
+        <p:nvPr/>
+      </p:nvGrpSpPr>
+      <p:grpSpPr>
+        <a:xfrm>
+          <a:off x="0" y="0"/>
+          <a:ext cx="0" cy="0"/>
+          <a:chOff x="0" y="0"/>
+          <a:chExt cx="0" cy="0"/>
+        </a:xfrm>
+      </p:grpSpPr>
+      <p:sp>
+        <p:nvSpPr>
+          <p:cNvPr id="2" name="Title 1">
+            <a:extLst>
+              <a:ext uri="{FF2B5EF4-FFF2-40B4-BE49-F238E27FC236}">
+                <a16:creationId xmlns:a16="http://schemas.microsoft.com/office/drawing/2014/main" id="{2D4978AF-F2B3-6927-447A-C0AEF85FD881}"/>
+              </a:ext>
+            </a:extLst>
+          </p:cNvPr>
+          <p:cNvSpPr>
+            <a:spLocks noGrp="1"/>
+          </p:cNvSpPr>
+          <p:nvPr>
+            <p:ph type="title"/>
+          </p:nvPr>
+        </p:nvSpPr>
+        <p:spPr>
+          <a:xfrm>
+            <a:off x="646111" y="452718"/>
+            <a:ext cx="9863050" cy="1066989"/>
+          </a:xfrm>
+        </p:spPr>
+        <p:txBody>
+          <a:bodyPr/>
+          <a:lstStyle/>
+          <a:p>
+            <a:r>
+              <a:rPr lang="en-US" dirty="0"/>
+              <a:t>JEP-505: Structured Concurrency(5</a:t>
+            </a:r>
+            <a:r>
+              <a:rPr lang="en-US" baseline="30000" dirty="0"/>
+              <a:t>th</a:t>
+            </a:r>
+            <a:r>
+              <a:rPr lang="en-US" dirty="0"/>
+              <a:t> Preview)</a:t>
+            </a:r>
+          </a:p>
+        </p:txBody>
+      </p:sp>
+      <p:sp>
+        <p:nvSpPr>
+          <p:cNvPr id="3" name="Content Placeholder 2">
+            <a:extLst>
+              <a:ext uri="{FF2B5EF4-FFF2-40B4-BE49-F238E27FC236}">
+                <a16:creationId xmlns:a16="http://schemas.microsoft.com/office/drawing/2014/main" id="{C302F815-B73C-7AB1-BF76-25C4767377C5}"/>
+              </a:ext>
+            </a:extLst>
+          </p:cNvPr>
+          <p:cNvSpPr>
+            <a:spLocks noGrp="1"/>
+          </p:cNvSpPr>
+          <p:nvPr>
+            <p:ph idx="1"/>
+          </p:nvPr>
+        </p:nvSpPr>
+        <p:spPr>
+          <a:xfrm>
+            <a:off x="400050" y="2052918"/>
+            <a:ext cx="5314951" cy="4195481"/>
+          </a:xfrm>
+        </p:spPr>
+        <p:txBody>
+          <a:bodyPr>
+            <a:normAutofit/>
+          </a:bodyPr>
+          <a:lstStyle/>
+          <a:p>
+            <a:pPr lvl="1"/>
+            <a:r>
+              <a:rPr lang="en-US" sz="2600" dirty="0"/>
+              <a:t>Work started in Java 19</a:t>
+            </a:r>
+          </a:p>
+          <a:p>
+            <a:pPr lvl="1"/>
+            <a:r>
+              <a:rPr lang="en-US" sz="2600" dirty="0"/>
+              <a:t>Treats different threads as a single unit of work</a:t>
+            </a:r>
+          </a:p>
+          <a:p>
+            <a:pPr lvl="1"/>
+            <a:r>
+              <a:rPr lang="en-US" sz="2600" dirty="0"/>
+              <a:t>In Java 25 </a:t>
+            </a:r>
+          </a:p>
+          <a:p>
+            <a:pPr lvl="2"/>
+            <a:r>
+              <a:rPr lang="en-US" sz="2400" dirty="0"/>
+              <a:t> static factory methods</a:t>
+            </a:r>
+          </a:p>
+          <a:p>
+            <a:pPr lvl="2"/>
+            <a:r>
+              <a:rPr lang="en-US" sz="2400"/>
+              <a:t>Joiner policies</a:t>
+            </a:r>
+            <a:endParaRPr lang="en-US" sz="2400" dirty="0"/>
+          </a:p>
+        </p:txBody>
+      </p:sp>
+      <p:pic>
+        <p:nvPicPr>
+          <p:cNvPr id="5" name="Picture 4" descr="A diagram of a task&#10;&#10;AI-generated content may be incorrect.">
+            <a:extLst>
+              <a:ext uri="{FF2B5EF4-FFF2-40B4-BE49-F238E27FC236}">
+                <a16:creationId xmlns:a16="http://schemas.microsoft.com/office/drawing/2014/main" id="{F75013B6-1B36-77D9-6FDF-92714015BB69}"/>
+              </a:ext>
+            </a:extLst>
+          </p:cNvPr>
+          <p:cNvPicPr>
+            <a:picLocks noChangeAspect="1"/>
+          </p:cNvPicPr>
+          <p:nvPr/>
+        </p:nvPicPr>
+        <p:blipFill>
+          <a:blip r:embed="rId2"/>
+          <a:stretch>
+            <a:fillRect/>
+          </a:stretch>
+        </p:blipFill>
+        <p:spPr>
+          <a:xfrm>
+            <a:off x="5995989" y="1519707"/>
+            <a:ext cx="5549900" cy="5016500"/>
+          </a:xfrm>
+          <a:prstGeom prst="rect">
+            <a:avLst/>
+          </a:prstGeom>
+        </p:spPr>
+      </p:pic>
+    </p:spTree>
+    <p:extLst>
+      <p:ext uri="{BB962C8B-B14F-4D97-AF65-F5344CB8AC3E}">
+        <p14:creationId xmlns:p14="http://schemas.microsoft.com/office/powerpoint/2010/main" val="2052983472"/>
+      </p:ext>
+    </p:extLst>
+  </p:cSld>
+  <p:clrMapOvr>
+    <a:masterClrMapping/>
+  </p:clrMapOvr>
+</p:sld>
+</file>
+
+<file path=ppt/slides/slide32.xml><?xml version="1.0" encoding="utf-8"?>
+<p:sld xmlns:a="http://schemas.openxmlformats.org/drawingml/2006/main" xmlns:r="http://schemas.openxmlformats.org/officeDocument/2006/relationships" xmlns:p="http://schemas.openxmlformats.org/presentationml/2006/main">
+  <p:cSld>
+    <p:spTree>
+      <p:nvGrpSpPr>
+        <p:cNvPr id="1" name="">
+          <a:extLst>
+            <a:ext uri="{FF2B5EF4-FFF2-40B4-BE49-F238E27FC236}">
               <a16:creationId xmlns:a16="http://schemas.microsoft.com/office/drawing/2014/main" id="{2A16D755-B15E-6154-73BE-EDCE7C874876}"/>
             </a:ext>
           </a:extLst>
@@ -21303,7 +21670,7 @@
           <a:p>
             <a:r>
               <a:rPr lang="en-US" dirty="0"/>
-              <a:t>Module Import Declarations</a:t>
+              <a:t>JEP 511 - Module Import Declarations</a:t>
             </a:r>
           </a:p>
         </p:txBody>
@@ -21334,7 +21701,7 @@
             <a:pPr lvl="1"/>
             <a:r>
               <a:rPr lang="en-US" sz="2600" dirty="0"/>
-              <a:t># TODO</a:t>
+              <a:t>To explain this, I need first to explain…</a:t>
             </a:r>
           </a:p>
         </p:txBody>
@@ -21352,7 +21719,7 @@
 </p:sld>
 </file>
 
-<file path=ppt/slides/slide31.xml><?xml version="1.0" encoding="utf-8"?>
+<file path=ppt/slides/slide33.xml><?xml version="1.0" encoding="utf-8"?>
 <p:sld xmlns:a="http://schemas.openxmlformats.org/drawingml/2006/main" xmlns:r="http://schemas.openxmlformats.org/officeDocument/2006/relationships" xmlns:p="http://schemas.openxmlformats.org/presentationml/2006/main">
   <p:cSld>
     <p:spTree>
@@ -21457,7 +21824,7 @@
 </p:sld>
 </file>
 
-<file path=ppt/slides/slide32.xml><?xml version="1.0" encoding="utf-8"?>
+<file path=ppt/slides/slide34.xml><?xml version="1.0" encoding="utf-8"?>
 <p:sld xmlns:a="http://schemas.openxmlformats.org/drawingml/2006/main" xmlns:r="http://schemas.openxmlformats.org/officeDocument/2006/relationships" xmlns:p="http://schemas.openxmlformats.org/presentationml/2006/main">
   <p:cSld>
     <p:spTree>
@@ -21552,7 +21919,7 @@
 </p:sld>
 </file>
 
-<file path=ppt/slides/slide33.xml><?xml version="1.0" encoding="utf-8"?>
+<file path=ppt/slides/slide35.xml><?xml version="1.0" encoding="utf-8"?>
 <p:sld xmlns:a="http://schemas.openxmlformats.org/drawingml/2006/main" xmlns:r="http://schemas.openxmlformats.org/officeDocument/2006/relationships" xmlns:p="http://schemas.openxmlformats.org/presentationml/2006/main">
   <p:cSld>
     <p:spTree>
@@ -21652,7 +22019,7 @@
 </p:sld>
 </file>
 
-<file path=ppt/slides/slide34.xml><?xml version="1.0" encoding="utf-8"?>
+<file path=ppt/slides/slide36.xml><?xml version="1.0" encoding="utf-8"?>
 <p:sld xmlns:a="http://schemas.openxmlformats.org/drawingml/2006/main" xmlns:r="http://schemas.openxmlformats.org/officeDocument/2006/relationships" xmlns:p="http://schemas.openxmlformats.org/presentationml/2006/main">
   <p:cSld>
     <p:spTree>
@@ -21760,115 +22127,7 @@
 </p:sld>
 </file>
 
-<file path=ppt/slides/slide35.xml><?xml version="1.0" encoding="utf-8"?>
-<p:sld xmlns:a="http://schemas.openxmlformats.org/drawingml/2006/main" xmlns:r="http://schemas.openxmlformats.org/officeDocument/2006/relationships" xmlns:p="http://schemas.openxmlformats.org/presentationml/2006/main">
-  <p:cSld>
-    <p:spTree>
-      <p:nvGrpSpPr>
-        <p:cNvPr id="1" name="">
-          <a:extLst>
-            <a:ext uri="{FF2B5EF4-FFF2-40B4-BE49-F238E27FC236}">
-              <a16:creationId xmlns:a16="http://schemas.microsoft.com/office/drawing/2014/main" id="{740E3B0D-47CD-1B36-D29F-6A90009A5C89}"/>
-            </a:ext>
-          </a:extLst>
-        </p:cNvPr>
-        <p:cNvGrpSpPr/>
-        <p:nvPr/>
-      </p:nvGrpSpPr>
-      <p:grpSpPr>
-        <a:xfrm>
-          <a:off x="0" y="0"/>
-          <a:ext cx="0" cy="0"/>
-          <a:chOff x="0" y="0"/>
-          <a:chExt cx="0" cy="0"/>
-        </a:xfrm>
-      </p:grpSpPr>
-      <p:sp>
-        <p:nvSpPr>
-          <p:cNvPr id="2" name="Title 1">
-            <a:extLst>
-              <a:ext uri="{FF2B5EF4-FFF2-40B4-BE49-F238E27FC236}">
-                <a16:creationId xmlns:a16="http://schemas.microsoft.com/office/drawing/2014/main" id="{2D4978AF-F2B3-6927-447A-C0AEF85FD881}"/>
-              </a:ext>
-            </a:extLst>
-          </p:cNvPr>
-          <p:cNvSpPr>
-            <a:spLocks noGrp="1"/>
-          </p:cNvSpPr>
-          <p:nvPr>
-            <p:ph type="title"/>
-          </p:nvPr>
-        </p:nvSpPr>
-        <p:spPr>
-          <a:xfrm>
-            <a:off x="646111" y="452718"/>
-            <a:ext cx="9863050" cy="1066989"/>
-          </a:xfrm>
-        </p:spPr>
-        <p:txBody>
-          <a:bodyPr/>
-          <a:lstStyle/>
-          <a:p>
-            <a:r>
-              <a:rPr lang="en-US" dirty="0"/>
-              <a:t>Structured Concurrency(5</a:t>
-            </a:r>
-            <a:r>
-              <a:rPr lang="en-US" baseline="30000" dirty="0"/>
-              <a:t>th</a:t>
-            </a:r>
-            <a:r>
-              <a:rPr lang="en-US" dirty="0"/>
-              <a:t> Preview)</a:t>
-            </a:r>
-          </a:p>
-        </p:txBody>
-      </p:sp>
-      <p:sp>
-        <p:nvSpPr>
-          <p:cNvPr id="3" name="Content Placeholder 2">
-            <a:extLst>
-              <a:ext uri="{FF2B5EF4-FFF2-40B4-BE49-F238E27FC236}">
-                <a16:creationId xmlns:a16="http://schemas.microsoft.com/office/drawing/2014/main" id="{C302F815-B73C-7AB1-BF76-25C4767377C5}"/>
-              </a:ext>
-            </a:extLst>
-          </p:cNvPr>
-          <p:cNvSpPr>
-            <a:spLocks noGrp="1"/>
-          </p:cNvSpPr>
-          <p:nvPr>
-            <p:ph idx="1"/>
-          </p:nvPr>
-        </p:nvSpPr>
-        <p:spPr/>
-        <p:txBody>
-          <a:bodyPr>
-            <a:normAutofit/>
-          </a:bodyPr>
-          <a:lstStyle/>
-          <a:p>
-            <a:pPr lvl="1"/>
-            <a:r>
-              <a:rPr lang="en-US" sz="2600" dirty="0"/>
-              <a:t># TODO</a:t>
-            </a:r>
-          </a:p>
-        </p:txBody>
-      </p:sp>
-    </p:spTree>
-    <p:extLst>
-      <p:ext uri="{BB962C8B-B14F-4D97-AF65-F5344CB8AC3E}">
-        <p14:creationId xmlns:p14="http://schemas.microsoft.com/office/powerpoint/2010/main" val="2052983472"/>
-      </p:ext>
-    </p:extLst>
-  </p:cSld>
-  <p:clrMapOvr>
-    <a:masterClrMapping/>
-  </p:clrMapOvr>
-</p:sld>
-</file>
-
-<file path=ppt/slides/slide36.xml><?xml version="1.0" encoding="utf-8"?>
+<file path=ppt/slides/slide37.xml><?xml version="1.0" encoding="utf-8"?>
 <p:sld xmlns:a="http://schemas.openxmlformats.org/drawingml/2006/main" xmlns:r="http://schemas.openxmlformats.org/officeDocument/2006/relationships" xmlns:p="http://schemas.openxmlformats.org/presentationml/2006/main">
   <p:cSld>
     <p:bg>
@@ -23028,7 +23287,7 @@
 </p:sld>
 </file>
 
-<file path=ppt/slides/slide37.xml><?xml version="1.0" encoding="utf-8"?>
+<file path=ppt/slides/slide38.xml><?xml version="1.0" encoding="utf-8"?>
 <p:sld xmlns:a="http://schemas.openxmlformats.org/drawingml/2006/main" xmlns:r="http://schemas.openxmlformats.org/officeDocument/2006/relationships" xmlns:p="http://schemas.openxmlformats.org/presentationml/2006/main">
   <p:cSld>
     <p:bg>
@@ -24168,7 +24427,7 @@
 </p:sld>
 </file>
 
-<file path=ppt/slides/slide38.xml><?xml version="1.0" encoding="utf-8"?>
+<file path=ppt/slides/slide39.xml><?xml version="1.0" encoding="utf-8"?>
 <p:sld xmlns:a="http://schemas.openxmlformats.org/drawingml/2006/main" xmlns:r="http://schemas.openxmlformats.org/officeDocument/2006/relationships" xmlns:p="http://schemas.openxmlformats.org/presentationml/2006/main">
   <p:cSld>
     <p:bg>
@@ -25565,94 +25824,6 @@
 </p:sld>
 </file>
 
-<file path=ppt/slides/slide39.xml><?xml version="1.0" encoding="utf-8"?>
-<p:sld xmlns:a="http://schemas.openxmlformats.org/drawingml/2006/main" xmlns:r="http://schemas.openxmlformats.org/officeDocument/2006/relationships" xmlns:p="http://schemas.openxmlformats.org/presentationml/2006/main">
-  <p:cSld>
-    <p:spTree>
-      <p:nvGrpSpPr>
-        <p:cNvPr id="1" name=""/>
-        <p:cNvGrpSpPr/>
-        <p:nvPr/>
-      </p:nvGrpSpPr>
-      <p:grpSpPr>
-        <a:xfrm>
-          <a:off x="0" y="0"/>
-          <a:ext cx="0" cy="0"/>
-          <a:chOff x="0" y="0"/>
-          <a:chExt cx="0" cy="0"/>
-        </a:xfrm>
-      </p:grpSpPr>
-      <p:sp>
-        <p:nvSpPr>
-          <p:cNvPr id="2" name="Title 1">
-            <a:extLst>
-              <a:ext uri="{FF2B5EF4-FFF2-40B4-BE49-F238E27FC236}">
-                <a16:creationId xmlns:a16="http://schemas.microsoft.com/office/drawing/2014/main" id="{AB6C0888-59A4-3A97-EF04-F5F640FEDB67}"/>
-              </a:ext>
-            </a:extLst>
-          </p:cNvPr>
-          <p:cNvSpPr>
-            <a:spLocks noGrp="1"/>
-          </p:cNvSpPr>
-          <p:nvPr>
-            <p:ph type="title"/>
-          </p:nvPr>
-        </p:nvSpPr>
-        <p:spPr/>
-        <p:txBody>
-          <a:bodyPr/>
-          <a:lstStyle/>
-          <a:p>
-            <a:r>
-              <a:rPr lang="en-US" dirty="0"/>
-              <a:t>Spring 7</a:t>
-            </a:r>
-          </a:p>
-        </p:txBody>
-      </p:sp>
-      <p:sp>
-        <p:nvSpPr>
-          <p:cNvPr id="3" name="Content Placeholder 2">
-            <a:extLst>
-              <a:ext uri="{FF2B5EF4-FFF2-40B4-BE49-F238E27FC236}">
-                <a16:creationId xmlns:a16="http://schemas.microsoft.com/office/drawing/2014/main" id="{A7822E91-0948-284A-5D51-F5FDC0330031}"/>
-              </a:ext>
-            </a:extLst>
-          </p:cNvPr>
-          <p:cNvSpPr>
-            <a:spLocks noGrp="1"/>
-          </p:cNvSpPr>
-          <p:nvPr>
-            <p:ph idx="1"/>
-          </p:nvPr>
-        </p:nvSpPr>
-        <p:spPr/>
-        <p:txBody>
-          <a:bodyPr>
-            <a:normAutofit/>
-          </a:bodyPr>
-          <a:lstStyle/>
-          <a:p>
-            <a:r>
-              <a:rPr lang="en-US" sz="2800" dirty="0"/>
-              <a:t>#TODO</a:t>
-            </a:r>
-          </a:p>
-        </p:txBody>
-      </p:sp>
-    </p:spTree>
-    <p:extLst>
-      <p:ext uri="{BB962C8B-B14F-4D97-AF65-F5344CB8AC3E}">
-        <p14:creationId xmlns:p14="http://schemas.microsoft.com/office/powerpoint/2010/main" val="2899600124"/>
-      </p:ext>
-    </p:extLst>
-  </p:cSld>
-  <p:clrMapOvr>
-    <a:masterClrMapping/>
-  </p:clrMapOvr>
-</p:sld>
-</file>
-
 <file path=ppt/slides/slide4.xml><?xml version="1.0" encoding="utf-8"?>
 <p:sld xmlns:a="http://schemas.openxmlformats.org/drawingml/2006/main" xmlns:r="http://schemas.openxmlformats.org/officeDocument/2006/relationships" xmlns:p="http://schemas.openxmlformats.org/presentationml/2006/main">
   <p:cSld>
@@ -25855,6 +26026,94 @@
           <p:cNvPr id="2" name="Title 1">
             <a:extLst>
               <a:ext uri="{FF2B5EF4-FFF2-40B4-BE49-F238E27FC236}">
+                <a16:creationId xmlns:a16="http://schemas.microsoft.com/office/drawing/2014/main" id="{AB6C0888-59A4-3A97-EF04-F5F640FEDB67}"/>
+              </a:ext>
+            </a:extLst>
+          </p:cNvPr>
+          <p:cNvSpPr>
+            <a:spLocks noGrp="1"/>
+          </p:cNvSpPr>
+          <p:nvPr>
+            <p:ph type="title"/>
+          </p:nvPr>
+        </p:nvSpPr>
+        <p:spPr/>
+        <p:txBody>
+          <a:bodyPr/>
+          <a:lstStyle/>
+          <a:p>
+            <a:r>
+              <a:rPr lang="en-US" dirty="0"/>
+              <a:t>Spring 7</a:t>
+            </a:r>
+          </a:p>
+        </p:txBody>
+      </p:sp>
+      <p:sp>
+        <p:nvSpPr>
+          <p:cNvPr id="3" name="Content Placeholder 2">
+            <a:extLst>
+              <a:ext uri="{FF2B5EF4-FFF2-40B4-BE49-F238E27FC236}">
+                <a16:creationId xmlns:a16="http://schemas.microsoft.com/office/drawing/2014/main" id="{A7822E91-0948-284A-5D51-F5FDC0330031}"/>
+              </a:ext>
+            </a:extLst>
+          </p:cNvPr>
+          <p:cNvSpPr>
+            <a:spLocks noGrp="1"/>
+          </p:cNvSpPr>
+          <p:nvPr>
+            <p:ph idx="1"/>
+          </p:nvPr>
+        </p:nvSpPr>
+        <p:spPr/>
+        <p:txBody>
+          <a:bodyPr>
+            <a:normAutofit/>
+          </a:bodyPr>
+          <a:lstStyle/>
+          <a:p>
+            <a:r>
+              <a:rPr lang="en-US" sz="2800" dirty="0"/>
+              <a:t>#TODO</a:t>
+            </a:r>
+          </a:p>
+        </p:txBody>
+      </p:sp>
+    </p:spTree>
+    <p:extLst>
+      <p:ext uri="{BB962C8B-B14F-4D97-AF65-F5344CB8AC3E}">
+        <p14:creationId xmlns:p14="http://schemas.microsoft.com/office/powerpoint/2010/main" val="2899600124"/>
+      </p:ext>
+    </p:extLst>
+  </p:cSld>
+  <p:clrMapOvr>
+    <a:masterClrMapping/>
+  </p:clrMapOvr>
+</p:sld>
+</file>
+
+<file path=ppt/slides/slide41.xml><?xml version="1.0" encoding="utf-8"?>
+<p:sld xmlns:a="http://schemas.openxmlformats.org/drawingml/2006/main" xmlns:r="http://schemas.openxmlformats.org/officeDocument/2006/relationships" xmlns:p="http://schemas.openxmlformats.org/presentationml/2006/main">
+  <p:cSld>
+    <p:spTree>
+      <p:nvGrpSpPr>
+        <p:cNvPr id="1" name=""/>
+        <p:cNvGrpSpPr/>
+        <p:nvPr/>
+      </p:nvGrpSpPr>
+      <p:grpSpPr>
+        <a:xfrm>
+          <a:off x="0" y="0"/>
+          <a:ext cx="0" cy="0"/>
+          <a:chOff x="0" y="0"/>
+          <a:chExt cx="0" cy="0"/>
+        </a:xfrm>
+      </p:grpSpPr>
+      <p:sp>
+        <p:nvSpPr>
+          <p:cNvPr id="2" name="Title 1">
+            <a:extLst>
+              <a:ext uri="{FF2B5EF4-FFF2-40B4-BE49-F238E27FC236}">
                 <a16:creationId xmlns:a16="http://schemas.microsoft.com/office/drawing/2014/main" id="{7E1A6C48-3D5B-B8F0-C46C-33E81B4D6BDC}"/>
               </a:ext>
             </a:extLst>
@@ -26027,7 +26286,7 @@
 </p:sld>
 </file>
 
-<file path=ppt/slides/slide41.xml><?xml version="1.0" encoding="utf-8"?>
+<file path=ppt/slides/slide42.xml><?xml version="1.0" encoding="utf-8"?>
 <p:sld xmlns:a="http://schemas.openxmlformats.org/drawingml/2006/main" xmlns:r="http://schemas.openxmlformats.org/officeDocument/2006/relationships" xmlns:p="http://schemas.openxmlformats.org/presentationml/2006/main">
   <p:cSld>
     <p:spTree>
@@ -26117,9 +26376,15 @@
           <a:lstStyle/>
           <a:p>
             <a:r>
-              <a:rPr lang="en-US" sz="2800" dirty="0"/>
-              <a:t>#TODO</a:t>
-            </a:r>
+              <a:rPr lang="en-US" sz="2800" dirty="0">
+                <a:hlinkClick r:id="rId2"/>
+              </a:rPr>
+              <a:t>https://rockthejvm.com/articles/the-ultimate-guide-to-java-virtual-threads</a:t>
+            </a:r>
+            <a:endParaRPr lang="en-US" sz="2800" dirty="0"/>
+          </a:p>
+          <a:p>
+            <a:endParaRPr lang="en-US" sz="2800" dirty="0"/>
           </a:p>
         </p:txBody>
       </p:sp>
@@ -26136,7 +26401,7 @@
 </p:sld>
 </file>
 
-<file path=ppt/slides/slide42.xml><?xml version="1.0" encoding="utf-8"?>
+<file path=ppt/slides/slide43.xml><?xml version="1.0" encoding="utf-8"?>
 <p:sld xmlns:a="http://schemas.openxmlformats.org/drawingml/2006/main" xmlns:r="http://schemas.openxmlformats.org/officeDocument/2006/relationships" xmlns:p="http://schemas.openxmlformats.org/presentationml/2006/main">
   <p:cSld>
     <p:spTree>

</xml_diff>